<commit_message>
add images to presentation, remvoe placeholder and rename folder
</commit_message>
<xml_diff>
--- a/workshops/2019_10_23/Präsentation 23_10_2019.pptx
+++ b/workshops/2019_10_23/Präsentation 23_10_2019.pptx
@@ -5,7 +5,7 @@
     <p:sldMasterId id="2147483648" r:id="rId1"/>
   </p:sldMasterIdLst>
   <p:notesMasterIdLst>
-    <p:notesMasterId r:id="rId13"/>
+    <p:notesMasterId r:id="rId14"/>
   </p:notesMasterIdLst>
   <p:sldIdLst>
     <p:sldId id="256" r:id="rId2"/>
@@ -14,11 +14,12 @@
     <p:sldId id="273" r:id="rId5"/>
     <p:sldId id="274" r:id="rId6"/>
     <p:sldId id="269" r:id="rId7"/>
-    <p:sldId id="270" r:id="rId8"/>
-    <p:sldId id="271" r:id="rId9"/>
-    <p:sldId id="272" r:id="rId10"/>
-    <p:sldId id="275" r:id="rId11"/>
-    <p:sldId id="276" r:id="rId12"/>
+    <p:sldId id="277" r:id="rId8"/>
+    <p:sldId id="270" r:id="rId9"/>
+    <p:sldId id="271" r:id="rId10"/>
+    <p:sldId id="272" r:id="rId11"/>
+    <p:sldId id="275" r:id="rId12"/>
+    <p:sldId id="276" r:id="rId13"/>
   </p:sldIdLst>
   <p:sldSz cx="12192000" cy="6858000"/>
   <p:notesSz cx="6858000" cy="9144000"/>
@@ -207,7 +208,7 @@
           <a:p>
             <a:fld id="{E3599E8E-A991-475F-AF77-DE09EB48F9ED}" type="datetimeFigureOut">
               <a:rPr lang="de-DE" smtClean="0"/>
-              <a:t>20.10.2019</a:t>
+              <a:t>21.10.2019</a:t>
             </a:fld>
             <a:endParaRPr lang="de-DE"/>
           </a:p>
@@ -365,7 +366,7 @@
           <a:p>
             <a:fld id="{11428D28-81C1-40CB-B8E7-71448353209F}" type="slidenum">
               <a:rPr lang="de-DE" smtClean="0"/>
-              <a:t>‹#›</a:t>
+              <a:t>‹Nr.›</a:t>
             </a:fld>
             <a:endParaRPr lang="de-DE"/>
           </a:p>
@@ -638,6 +639,93 @@
     </p:spTree>
     <p:extLst>
       <p:ext uri="{BB962C8B-B14F-4D97-AF65-F5344CB8AC3E}">
+        <p14:creationId xmlns:p14="http://schemas.microsoft.com/office/powerpoint/2010/main" val="3300451514"/>
+      </p:ext>
+    </p:extLst>
+  </p:cSld>
+  <p:clrMapOvr>
+    <a:masterClrMapping/>
+  </p:clrMapOvr>
+</p:notes>
+</file>
+
+<file path=ppt/notesSlides/notesSlide11.xml><?xml version="1.0" encoding="utf-8"?>
+<p:notes xmlns:a="http://schemas.openxmlformats.org/drawingml/2006/main" xmlns:r="http://schemas.openxmlformats.org/officeDocument/2006/relationships" xmlns:p="http://schemas.openxmlformats.org/presentationml/2006/main">
+  <p:cSld>
+    <p:spTree>
+      <p:nvGrpSpPr>
+        <p:cNvPr id="1" name=""/>
+        <p:cNvGrpSpPr/>
+        <p:nvPr/>
+      </p:nvGrpSpPr>
+      <p:grpSpPr>
+        <a:xfrm>
+          <a:off x="0" y="0"/>
+          <a:ext cx="0" cy="0"/>
+          <a:chOff x="0" y="0"/>
+          <a:chExt cx="0" cy="0"/>
+        </a:xfrm>
+      </p:grpSpPr>
+      <p:sp>
+        <p:nvSpPr>
+          <p:cNvPr id="2" name="Folienbildplatzhalter 1"/>
+          <p:cNvSpPr>
+            <a:spLocks noGrp="1" noRot="1" noChangeAspect="1"/>
+          </p:cNvSpPr>
+          <p:nvPr>
+            <p:ph type="sldImg"/>
+          </p:nvPr>
+        </p:nvSpPr>
+        <p:spPr/>
+      </p:sp>
+      <p:sp>
+        <p:nvSpPr>
+          <p:cNvPr id="3" name="Notizenplatzhalter 2"/>
+          <p:cNvSpPr>
+            <a:spLocks noGrp="1"/>
+          </p:cNvSpPr>
+          <p:nvPr>
+            <p:ph type="body" idx="1"/>
+          </p:nvPr>
+        </p:nvSpPr>
+        <p:spPr/>
+        <p:txBody>
+          <a:bodyPr/>
+          <a:lstStyle/>
+          <a:p>
+            <a:r>
+              <a:rPr lang="de-DE" dirty="0"/>
+              <a:t>Nils</a:t>
+            </a:r>
+          </a:p>
+        </p:txBody>
+      </p:sp>
+      <p:sp>
+        <p:nvSpPr>
+          <p:cNvPr id="4" name="Foliennummernplatzhalter 3"/>
+          <p:cNvSpPr>
+            <a:spLocks noGrp="1"/>
+          </p:cNvSpPr>
+          <p:nvPr>
+            <p:ph type="sldNum" sz="quarter" idx="5"/>
+          </p:nvPr>
+        </p:nvSpPr>
+        <p:spPr/>
+        <p:txBody>
+          <a:bodyPr/>
+          <a:lstStyle/>
+          <a:p>
+            <a:fld id="{11428D28-81C1-40CB-B8E7-71448353209F}" type="slidenum">
+              <a:rPr lang="de-DE" smtClean="0"/>
+              <a:t>12</a:t>
+            </a:fld>
+            <a:endParaRPr lang="de-DE"/>
+          </a:p>
+        </p:txBody>
+      </p:sp>
+    </p:spTree>
+    <p:extLst>
+      <p:ext uri="{BB962C8B-B14F-4D97-AF65-F5344CB8AC3E}">
         <p14:creationId xmlns:p14="http://schemas.microsoft.com/office/powerpoint/2010/main" val="3620987227"/>
       </p:ext>
     </p:extLst>
@@ -1073,7 +1161,7 @@
     </p:spTree>
     <p:extLst>
       <p:ext uri="{BB962C8B-B14F-4D97-AF65-F5344CB8AC3E}">
-        <p14:creationId xmlns:p14="http://schemas.microsoft.com/office/powerpoint/2010/main" val="133613382"/>
+        <p14:creationId xmlns:p14="http://schemas.microsoft.com/office/powerpoint/2010/main" val="2584944711"/>
       </p:ext>
     </p:extLst>
   </p:cSld>
@@ -1160,7 +1248,7 @@
     </p:spTree>
     <p:extLst>
       <p:ext uri="{BB962C8B-B14F-4D97-AF65-F5344CB8AC3E}">
-        <p14:creationId xmlns:p14="http://schemas.microsoft.com/office/powerpoint/2010/main" val="159180063"/>
+        <p14:creationId xmlns:p14="http://schemas.microsoft.com/office/powerpoint/2010/main" val="133613382"/>
       </p:ext>
     </p:extLst>
   </p:cSld>
@@ -1247,7 +1335,7 @@
     </p:spTree>
     <p:extLst>
       <p:ext uri="{BB962C8B-B14F-4D97-AF65-F5344CB8AC3E}">
-        <p14:creationId xmlns:p14="http://schemas.microsoft.com/office/powerpoint/2010/main" val="1251476281"/>
+        <p14:creationId xmlns:p14="http://schemas.microsoft.com/office/powerpoint/2010/main" val="159180063"/>
       </p:ext>
     </p:extLst>
   </p:cSld>
@@ -1334,7 +1422,7 @@
     </p:spTree>
     <p:extLst>
       <p:ext uri="{BB962C8B-B14F-4D97-AF65-F5344CB8AC3E}">
-        <p14:creationId xmlns:p14="http://schemas.microsoft.com/office/powerpoint/2010/main" val="3300451514"/>
+        <p14:creationId xmlns:p14="http://schemas.microsoft.com/office/powerpoint/2010/main" val="1251476281"/>
       </p:ext>
     </p:extLst>
   </p:cSld>
@@ -1491,7 +1579,7 @@
           <a:p>
             <a:fld id="{1DFF6629-E111-4711-A1D3-7DE9729EAF6D}" type="datetimeFigureOut">
               <a:rPr lang="de-DE" smtClean="0"/>
-              <a:t>20.10.2019</a:t>
+              <a:t>21.10.2019</a:t>
             </a:fld>
             <a:endParaRPr lang="de-DE"/>
           </a:p>
@@ -1545,7 +1633,7 @@
           <a:p>
             <a:fld id="{A312F13E-1E93-4F6D-B514-E99E3F42818D}" type="slidenum">
               <a:rPr lang="de-DE" smtClean="0"/>
-              <a:t>‹#›</a:t>
+              <a:t>‹Nr.›</a:t>
             </a:fld>
             <a:endParaRPr lang="de-DE"/>
           </a:p>
@@ -1689,7 +1777,7 @@
           <a:p>
             <a:fld id="{1DFF6629-E111-4711-A1D3-7DE9729EAF6D}" type="datetimeFigureOut">
               <a:rPr lang="de-DE" smtClean="0"/>
-              <a:t>20.10.2019</a:t>
+              <a:t>21.10.2019</a:t>
             </a:fld>
             <a:endParaRPr lang="de-DE"/>
           </a:p>
@@ -1743,7 +1831,7 @@
           <a:p>
             <a:fld id="{A312F13E-1E93-4F6D-B514-E99E3F42818D}" type="slidenum">
               <a:rPr lang="de-DE" smtClean="0"/>
-              <a:t>‹#›</a:t>
+              <a:t>‹Nr.›</a:t>
             </a:fld>
             <a:endParaRPr lang="de-DE"/>
           </a:p>
@@ -1897,7 +1985,7 @@
           <a:p>
             <a:fld id="{1DFF6629-E111-4711-A1D3-7DE9729EAF6D}" type="datetimeFigureOut">
               <a:rPr lang="de-DE" smtClean="0"/>
-              <a:t>20.10.2019</a:t>
+              <a:t>21.10.2019</a:t>
             </a:fld>
             <a:endParaRPr lang="de-DE"/>
           </a:p>
@@ -1951,7 +2039,7 @@
           <a:p>
             <a:fld id="{A312F13E-1E93-4F6D-B514-E99E3F42818D}" type="slidenum">
               <a:rPr lang="de-DE" smtClean="0"/>
-              <a:t>‹#›</a:t>
+              <a:t>‹Nr.›</a:t>
             </a:fld>
             <a:endParaRPr lang="de-DE"/>
           </a:p>
@@ -2095,7 +2183,7 @@
           <a:p>
             <a:fld id="{1DFF6629-E111-4711-A1D3-7DE9729EAF6D}" type="datetimeFigureOut">
               <a:rPr lang="de-DE" smtClean="0"/>
-              <a:t>20.10.2019</a:t>
+              <a:t>21.10.2019</a:t>
             </a:fld>
             <a:endParaRPr lang="de-DE"/>
           </a:p>
@@ -2149,7 +2237,7 @@
           <a:p>
             <a:fld id="{A312F13E-1E93-4F6D-B514-E99E3F42818D}" type="slidenum">
               <a:rPr lang="de-DE" smtClean="0"/>
-              <a:t>‹#›</a:t>
+              <a:t>‹Nr.›</a:t>
             </a:fld>
             <a:endParaRPr lang="de-DE"/>
           </a:p>
@@ -2370,7 +2458,7 @@
           <a:p>
             <a:fld id="{1DFF6629-E111-4711-A1D3-7DE9729EAF6D}" type="datetimeFigureOut">
               <a:rPr lang="de-DE" smtClean="0"/>
-              <a:t>20.10.2019</a:t>
+              <a:t>21.10.2019</a:t>
             </a:fld>
             <a:endParaRPr lang="de-DE"/>
           </a:p>
@@ -2424,7 +2512,7 @@
           <a:p>
             <a:fld id="{A312F13E-1E93-4F6D-B514-E99E3F42818D}" type="slidenum">
               <a:rPr lang="de-DE" smtClean="0"/>
-              <a:t>‹#›</a:t>
+              <a:t>‹Nr.›</a:t>
             </a:fld>
             <a:endParaRPr lang="de-DE"/>
           </a:p>
@@ -2635,7 +2723,7 @@
           <a:p>
             <a:fld id="{1DFF6629-E111-4711-A1D3-7DE9729EAF6D}" type="datetimeFigureOut">
               <a:rPr lang="de-DE" smtClean="0"/>
-              <a:t>20.10.2019</a:t>
+              <a:t>21.10.2019</a:t>
             </a:fld>
             <a:endParaRPr lang="de-DE"/>
           </a:p>
@@ -2689,7 +2777,7 @@
           <a:p>
             <a:fld id="{A312F13E-1E93-4F6D-B514-E99E3F42818D}" type="slidenum">
               <a:rPr lang="de-DE" smtClean="0"/>
-              <a:t>‹#›</a:t>
+              <a:t>‹Nr.›</a:t>
             </a:fld>
             <a:endParaRPr lang="de-DE"/>
           </a:p>
@@ -3047,7 +3135,7 @@
           <a:p>
             <a:fld id="{1DFF6629-E111-4711-A1D3-7DE9729EAF6D}" type="datetimeFigureOut">
               <a:rPr lang="de-DE" smtClean="0"/>
-              <a:t>20.10.2019</a:t>
+              <a:t>21.10.2019</a:t>
             </a:fld>
             <a:endParaRPr lang="de-DE"/>
           </a:p>
@@ -3101,7 +3189,7 @@
           <a:p>
             <a:fld id="{A312F13E-1E93-4F6D-B514-E99E3F42818D}" type="slidenum">
               <a:rPr lang="de-DE" smtClean="0"/>
-              <a:t>‹#›</a:t>
+              <a:t>‹Nr.›</a:t>
             </a:fld>
             <a:endParaRPr lang="de-DE"/>
           </a:p>
@@ -3188,7 +3276,7 @@
           <a:p>
             <a:fld id="{1DFF6629-E111-4711-A1D3-7DE9729EAF6D}" type="datetimeFigureOut">
               <a:rPr lang="de-DE" smtClean="0"/>
-              <a:t>20.10.2019</a:t>
+              <a:t>21.10.2019</a:t>
             </a:fld>
             <a:endParaRPr lang="de-DE"/>
           </a:p>
@@ -3242,7 +3330,7 @@
           <a:p>
             <a:fld id="{A312F13E-1E93-4F6D-B514-E99E3F42818D}" type="slidenum">
               <a:rPr lang="de-DE" smtClean="0"/>
-              <a:t>‹#›</a:t>
+              <a:t>‹Nr.›</a:t>
             </a:fld>
             <a:endParaRPr lang="de-DE"/>
           </a:p>
@@ -3301,7 +3389,7 @@
           <a:p>
             <a:fld id="{1DFF6629-E111-4711-A1D3-7DE9729EAF6D}" type="datetimeFigureOut">
               <a:rPr lang="de-DE" smtClean="0"/>
-              <a:t>20.10.2019</a:t>
+              <a:t>21.10.2019</a:t>
             </a:fld>
             <a:endParaRPr lang="de-DE"/>
           </a:p>
@@ -3355,7 +3443,7 @@
           <a:p>
             <a:fld id="{A312F13E-1E93-4F6D-B514-E99E3F42818D}" type="slidenum">
               <a:rPr lang="de-DE" smtClean="0"/>
-              <a:t>‹#›</a:t>
+              <a:t>‹Nr.›</a:t>
             </a:fld>
             <a:endParaRPr lang="de-DE"/>
           </a:p>
@@ -3612,7 +3700,7 @@
           <a:p>
             <a:fld id="{1DFF6629-E111-4711-A1D3-7DE9729EAF6D}" type="datetimeFigureOut">
               <a:rPr lang="de-DE" smtClean="0"/>
-              <a:t>20.10.2019</a:t>
+              <a:t>21.10.2019</a:t>
             </a:fld>
             <a:endParaRPr lang="de-DE"/>
           </a:p>
@@ -3666,7 +3754,7 @@
           <a:p>
             <a:fld id="{A312F13E-1E93-4F6D-B514-E99E3F42818D}" type="slidenum">
               <a:rPr lang="de-DE" smtClean="0"/>
-              <a:t>‹#›</a:t>
+              <a:t>‹Nr.›</a:t>
             </a:fld>
             <a:endParaRPr lang="de-DE"/>
           </a:p>
@@ -3900,7 +3988,7 @@
           <a:p>
             <a:fld id="{1DFF6629-E111-4711-A1D3-7DE9729EAF6D}" type="datetimeFigureOut">
               <a:rPr lang="de-DE" smtClean="0"/>
-              <a:t>20.10.2019</a:t>
+              <a:t>21.10.2019</a:t>
             </a:fld>
             <a:endParaRPr lang="de-DE"/>
           </a:p>
@@ -3954,7 +4042,7 @@
           <a:p>
             <a:fld id="{A312F13E-1E93-4F6D-B514-E99E3F42818D}" type="slidenum">
               <a:rPr lang="de-DE" smtClean="0"/>
-              <a:t>‹#›</a:t>
+              <a:t>‹Nr.›</a:t>
             </a:fld>
             <a:endParaRPr lang="de-DE"/>
           </a:p>
@@ -4150,7 +4238,7 @@
           <a:p>
             <a:fld id="{1DFF6629-E111-4711-A1D3-7DE9729EAF6D}" type="datetimeFigureOut">
               <a:rPr lang="de-DE" smtClean="0"/>
-              <a:t>20.10.2019</a:t>
+              <a:t>21.10.2019</a:t>
             </a:fld>
             <a:endParaRPr lang="de-DE"/>
           </a:p>
@@ -4240,7 +4328,7 @@
           <a:p>
             <a:fld id="{A312F13E-1E93-4F6D-B514-E99E3F42818D}" type="slidenum">
               <a:rPr lang="de-DE" smtClean="0"/>
-              <a:t>‹#›</a:t>
+              <a:t>‹Nr.›</a:t>
             </a:fld>
             <a:endParaRPr lang="de-DE"/>
           </a:p>
@@ -4676,6 +4764,124 @@
           <a:p>
             <a:r>
               <a:rPr lang="de-DE" dirty="0"/>
+              <a:t>Datemodell Baum</a:t>
+            </a:r>
+          </a:p>
+        </p:txBody>
+      </p:sp>
+      <p:sp>
+        <p:nvSpPr>
+          <p:cNvPr id="3" name="Inhaltsplatzhalter 2">
+            <a:extLst>
+              <a:ext uri="{FF2B5EF4-FFF2-40B4-BE49-F238E27FC236}">
+                <a16:creationId xmlns:a16="http://schemas.microsoft.com/office/drawing/2014/main" id="{0C400920-B351-4D1F-BA2C-AEBB87CD9379}"/>
+              </a:ext>
+            </a:extLst>
+          </p:cNvPr>
+          <p:cNvSpPr>
+            <a:spLocks noGrp="1"/>
+          </p:cNvSpPr>
+          <p:nvPr>
+            <p:ph idx="1"/>
+          </p:nvPr>
+        </p:nvSpPr>
+        <p:spPr/>
+        <p:txBody>
+          <a:bodyPr/>
+          <a:lstStyle/>
+          <a:p>
+            <a:r>
+              <a:rPr lang="de-DE" dirty="0"/>
+              <a:t>Berechnung der „Verschmutzung“ in letztem Intervall</a:t>
+            </a:r>
+          </a:p>
+          <a:p>
+            <a:r>
+              <a:rPr lang="de-DE" dirty="0"/>
+              <a:t>Verzögerung </a:t>
+            </a:r>
+          </a:p>
+          <a:p>
+            <a:pPr lvl="1"/>
+            <a:r>
+              <a:rPr lang="de-DE" dirty="0"/>
+              <a:t>Bei Auswirkung</a:t>
+            </a:r>
+          </a:p>
+          <a:p>
+            <a:pPr lvl="1"/>
+            <a:r>
+              <a:rPr lang="de-DE" dirty="0"/>
+              <a:t>Und Regeneration</a:t>
+            </a:r>
+          </a:p>
+          <a:p>
+            <a:pPr marL="457200" lvl="1" indent="0">
+              <a:buNone/>
+            </a:pPr>
+            <a:endParaRPr lang="de-DE" dirty="0"/>
+          </a:p>
+          <a:p>
+            <a:pPr marL="457200" lvl="1" indent="0">
+              <a:buNone/>
+            </a:pPr>
+            <a:endParaRPr lang="de-DE" dirty="0"/>
+          </a:p>
+        </p:txBody>
+      </p:sp>
+    </p:spTree>
+    <p:extLst>
+      <p:ext uri="{BB962C8B-B14F-4D97-AF65-F5344CB8AC3E}">
+        <p14:creationId xmlns:p14="http://schemas.microsoft.com/office/powerpoint/2010/main" val="1682709236"/>
+      </p:ext>
+    </p:extLst>
+  </p:cSld>
+  <p:clrMapOvr>
+    <a:masterClrMapping/>
+  </p:clrMapOvr>
+</p:sld>
+</file>
+
+<file path=ppt/slides/slide11.xml><?xml version="1.0" encoding="utf-8"?>
+<p:sld xmlns:a="http://schemas.openxmlformats.org/drawingml/2006/main" xmlns:r="http://schemas.openxmlformats.org/officeDocument/2006/relationships" xmlns:p="http://schemas.openxmlformats.org/presentationml/2006/main">
+  <p:cSld>
+    <p:spTree>
+      <p:nvGrpSpPr>
+        <p:cNvPr id="1" name=""/>
+        <p:cNvGrpSpPr/>
+        <p:nvPr/>
+      </p:nvGrpSpPr>
+      <p:grpSpPr>
+        <a:xfrm>
+          <a:off x="0" y="0"/>
+          <a:ext cx="0" cy="0"/>
+          <a:chOff x="0" y="0"/>
+          <a:chExt cx="0" cy="0"/>
+        </a:xfrm>
+      </p:grpSpPr>
+      <p:sp>
+        <p:nvSpPr>
+          <p:cNvPr id="2" name="Titel 1">
+            <a:extLst>
+              <a:ext uri="{FF2B5EF4-FFF2-40B4-BE49-F238E27FC236}">
+                <a16:creationId xmlns:a16="http://schemas.microsoft.com/office/drawing/2014/main" id="{0992496D-39C0-4746-8D18-2B7492811CAF}"/>
+              </a:ext>
+            </a:extLst>
+          </p:cNvPr>
+          <p:cNvSpPr>
+            <a:spLocks noGrp="1"/>
+          </p:cNvSpPr>
+          <p:nvPr>
+            <p:ph type="title"/>
+          </p:nvPr>
+        </p:nvSpPr>
+        <p:spPr/>
+        <p:txBody>
+          <a:bodyPr/>
+          <a:lstStyle/>
+          <a:p>
+            <a:r>
+              <a:rPr lang="de-DE" dirty="0"/>
               <a:t>Untergrund</a:t>
             </a:r>
           </a:p>
@@ -4753,7 +4959,7 @@
 </p:sld>
 </file>
 
-<file path=ppt/slides/slide11.xml><?xml version="1.0" encoding="utf-8"?>
+<file path=ppt/slides/slide12.xml><?xml version="1.0" encoding="utf-8"?>
 <p:sld xmlns:a="http://schemas.openxmlformats.org/drawingml/2006/main" xmlns:r="http://schemas.openxmlformats.org/officeDocument/2006/relationships" xmlns:p="http://schemas.openxmlformats.org/presentationml/2006/main">
   <p:cSld>
     <p:spTree>
@@ -5395,18 +5601,6 @@
           <a:bodyPr/>
           <a:lstStyle/>
           <a:p>
-            <a:r>
-              <a:rPr lang="de-DE" dirty="0"/>
-              <a:t>Basisstation -&gt; BILD</a:t>
-            </a:r>
-          </a:p>
-          <a:p>
-            <a:r>
-              <a:rPr lang="de-DE" dirty="0"/>
-              <a:t>Auto -&gt; BILD</a:t>
-            </a:r>
-          </a:p>
-          <a:p>
             <a:pPr marL="457200" lvl="1" indent="0">
               <a:buNone/>
             </a:pPr>
@@ -5420,6 +5614,42 @@
           </a:p>
         </p:txBody>
       </p:sp>
+      <p:pic>
+        <p:nvPicPr>
+          <p:cNvPr id="5" name="Grafik 4" descr="Ein Bild, das Tisch, grün, Computer, Schild enthält.&#10;&#10;Automatisch generierte Beschreibung">
+            <a:extLst>
+              <a:ext uri="{FF2B5EF4-FFF2-40B4-BE49-F238E27FC236}">
+                <a16:creationId xmlns:a16="http://schemas.microsoft.com/office/drawing/2014/main" id="{989681F4-8743-4E3E-BFB8-4A9A8C85B1BA}"/>
+              </a:ext>
+            </a:extLst>
+          </p:cNvPr>
+          <p:cNvPicPr>
+            <a:picLocks noChangeAspect="1"/>
+          </p:cNvPicPr>
+          <p:nvPr/>
+        </p:nvPicPr>
+        <p:blipFill>
+          <a:blip r:embed="rId3">
+            <a:extLst>
+              <a:ext uri="{28A0092B-C50C-407E-A947-70E740481C1C}">
+                <a14:useLocalDpi xmlns:a14="http://schemas.microsoft.com/office/drawing/2010/main" val="0"/>
+              </a:ext>
+            </a:extLst>
+          </a:blip>
+          <a:stretch>
+            <a:fillRect/>
+          </a:stretch>
+        </p:blipFill>
+        <p:spPr>
+          <a:xfrm>
+            <a:off x="1571368" y="1342404"/>
+            <a:ext cx="9049264" cy="5515596"/>
+          </a:xfrm>
+          <a:prstGeom prst="rect">
+            <a:avLst/>
+          </a:prstGeom>
+        </p:spPr>
+      </p:pic>
     </p:spTree>
     <p:extLst>
       <p:ext uri="{BB962C8B-B14F-4D97-AF65-F5344CB8AC3E}">
@@ -5473,7 +5703,7 @@
           <a:p>
             <a:r>
               <a:rPr lang="de-DE" dirty="0"/>
-              <a:t>Schaltplan – Herausforderungen</a:t>
+              <a:t>Schaltplan - Stand</a:t>
             </a:r>
           </a:p>
         </p:txBody>
@@ -5498,51 +5728,6 @@
         <p:txBody>
           <a:bodyPr/>
           <a:lstStyle/>
-          <a:p>
-            <a:r>
-              <a:rPr lang="de-DE" dirty="0"/>
-              <a:t>Aktueller Microcontroller ungeeignet</a:t>
-            </a:r>
-          </a:p>
-          <a:p>
-            <a:pPr lvl="1"/>
-            <a:r>
-              <a:rPr lang="de-DE" dirty="0"/>
-              <a:t>Max. 3.3V vs 5V</a:t>
-            </a:r>
-          </a:p>
-          <a:p>
-            <a:pPr lvl="1"/>
-            <a:r>
-              <a:rPr lang="de-DE" dirty="0"/>
-              <a:t>Hall-Sensor benötigt mehr Volt</a:t>
-            </a:r>
-          </a:p>
-          <a:p>
-            <a:pPr lvl="1"/>
-            <a:r>
-              <a:rPr lang="de-DE" dirty="0"/>
-              <a:t>Kein  Datenblatt zu Sensoren</a:t>
-            </a:r>
-          </a:p>
-          <a:p>
-            <a:r>
-              <a:rPr lang="de-DE" dirty="0"/>
-              <a:t>Daher bislang keine Tests möglich</a:t>
-            </a:r>
-          </a:p>
-          <a:p>
-            <a:endParaRPr lang="de-DE" dirty="0"/>
-          </a:p>
-          <a:p>
-            <a:r>
-              <a:rPr lang="de-DE" dirty="0"/>
-              <a:t>-&gt; Warten auf Hardware</a:t>
-            </a:r>
-          </a:p>
-          <a:p>
-            <a:endParaRPr lang="de-DE" dirty="0"/>
-          </a:p>
           <a:p>
             <a:pPr marL="457200" lvl="1" indent="0">
               <a:buNone/>
@@ -5557,10 +5742,46 @@
           </a:p>
         </p:txBody>
       </p:sp>
+      <p:pic>
+        <p:nvPicPr>
+          <p:cNvPr id="6" name="Grafik 5" descr="Ein Bild, das Tisch, Parkplatz, weiß enthält.&#10;&#10;Automatisch generierte Beschreibung">
+            <a:extLst>
+              <a:ext uri="{FF2B5EF4-FFF2-40B4-BE49-F238E27FC236}">
+                <a16:creationId xmlns:a16="http://schemas.microsoft.com/office/drawing/2014/main" id="{3A88F726-91CC-44B8-A0ED-607601C10578}"/>
+              </a:ext>
+            </a:extLst>
+          </p:cNvPr>
+          <p:cNvPicPr>
+            <a:picLocks noChangeAspect="1"/>
+          </p:cNvPicPr>
+          <p:nvPr/>
+        </p:nvPicPr>
+        <p:blipFill>
+          <a:blip r:embed="rId3">
+            <a:extLst>
+              <a:ext uri="{28A0092B-C50C-407E-A947-70E740481C1C}">
+                <a14:useLocalDpi xmlns:a14="http://schemas.microsoft.com/office/drawing/2010/main" val="0"/>
+              </a:ext>
+            </a:extLst>
+          </a:blip>
+          <a:stretch>
+            <a:fillRect/>
+          </a:stretch>
+        </p:blipFill>
+        <p:spPr>
+          <a:xfrm>
+            <a:off x="3219563" y="1322641"/>
+            <a:ext cx="5752873" cy="5367408"/>
+          </a:xfrm>
+          <a:prstGeom prst="rect">
+            <a:avLst/>
+          </a:prstGeom>
+        </p:spPr>
+      </p:pic>
     </p:spTree>
     <p:extLst>
       <p:ext uri="{BB962C8B-B14F-4D97-AF65-F5344CB8AC3E}">
-        <p14:creationId xmlns:p14="http://schemas.microsoft.com/office/powerpoint/2010/main" val="3841598285"/>
+        <p14:creationId xmlns:p14="http://schemas.microsoft.com/office/powerpoint/2010/main" val="1595897628"/>
       </p:ext>
     </p:extLst>
   </p:cSld>
@@ -5610,7 +5831,7 @@
           <a:p>
             <a:r>
               <a:rPr lang="de-DE" dirty="0"/>
-              <a:t>Datemodell Fahrzeuge</a:t>
+              <a:t>Schaltplan – Herausforderungen</a:t>
             </a:r>
           </a:p>
         </p:txBody>
@@ -5638,8 +5859,47 @@
           <a:p>
             <a:r>
               <a:rPr lang="de-DE" dirty="0"/>
-              <a:t>BILD(JSON)</a:t>
-            </a:r>
+              <a:t>Aktueller Microcontroller ungeeignet</a:t>
+            </a:r>
+          </a:p>
+          <a:p>
+            <a:pPr lvl="1"/>
+            <a:r>
+              <a:rPr lang="de-DE" dirty="0"/>
+              <a:t>Max. 3.3V vs 5V</a:t>
+            </a:r>
+          </a:p>
+          <a:p>
+            <a:pPr lvl="1"/>
+            <a:r>
+              <a:rPr lang="de-DE" dirty="0"/>
+              <a:t>Hall-Sensor benötigt mehr Volt</a:t>
+            </a:r>
+          </a:p>
+          <a:p>
+            <a:pPr lvl="1"/>
+            <a:r>
+              <a:rPr lang="de-DE" dirty="0"/>
+              <a:t>Kein  Datenblatt zu Sensoren</a:t>
+            </a:r>
+          </a:p>
+          <a:p>
+            <a:r>
+              <a:rPr lang="de-DE" dirty="0"/>
+              <a:t>Daher bislang keine Tests möglich</a:t>
+            </a:r>
+          </a:p>
+          <a:p>
+            <a:endParaRPr lang="de-DE" dirty="0"/>
+          </a:p>
+          <a:p>
+            <a:r>
+              <a:rPr lang="de-DE" dirty="0"/>
+              <a:t>-&gt; Warten auf Hardware</a:t>
+            </a:r>
+          </a:p>
+          <a:p>
+            <a:endParaRPr lang="de-DE" dirty="0"/>
           </a:p>
           <a:p>
             <a:pPr marL="457200" lvl="1" indent="0">
@@ -5658,7 +5918,7 @@
     </p:spTree>
     <p:extLst>
       <p:ext uri="{BB962C8B-B14F-4D97-AF65-F5344CB8AC3E}">
-        <p14:creationId xmlns:p14="http://schemas.microsoft.com/office/powerpoint/2010/main" val="1309895707"/>
+        <p14:creationId xmlns:p14="http://schemas.microsoft.com/office/powerpoint/2010/main" val="3841598285"/>
       </p:ext>
     </p:extLst>
   </p:cSld>
@@ -5708,7 +5968,7 @@
           <a:p>
             <a:r>
               <a:rPr lang="de-DE" dirty="0"/>
-              <a:t>Datemodell Baum</a:t>
+              <a:t>Datemodell Fahrzeuge</a:t>
             </a:r>
           </a:p>
         </p:txBody>
@@ -5736,27 +5996,7 @@
           <a:p>
             <a:r>
               <a:rPr lang="de-DE" dirty="0"/>
-              <a:t>Berechnung der „Verschmutzung“ in letztem Intervall</a:t>
-            </a:r>
-          </a:p>
-          <a:p>
-            <a:r>
-              <a:rPr lang="de-DE" dirty="0"/>
-              <a:t>Verzögerung </a:t>
-            </a:r>
-          </a:p>
-          <a:p>
-            <a:pPr lvl="1"/>
-            <a:r>
-              <a:rPr lang="de-DE" dirty="0"/>
-              <a:t>Bei Auswirkung</a:t>
-            </a:r>
-          </a:p>
-          <a:p>
-            <a:pPr lvl="1"/>
-            <a:r>
-              <a:rPr lang="de-DE" dirty="0"/>
-              <a:t>Und Regeneration</a:t>
+              <a:t>BILD(JSON)</a:t>
             </a:r>
           </a:p>
           <a:p>
@@ -5776,7 +6016,7 @@
     </p:spTree>
     <p:extLst>
       <p:ext uri="{BB962C8B-B14F-4D97-AF65-F5344CB8AC3E}">
-        <p14:creationId xmlns:p14="http://schemas.microsoft.com/office/powerpoint/2010/main" val="1682709236"/>
+        <p14:creationId xmlns:p14="http://schemas.microsoft.com/office/powerpoint/2010/main" val="1309895707"/>
       </p:ext>
     </p:extLst>
   </p:cSld>

</xml_diff>

<commit_message>
car fastening, slides and screenshots
</commit_message>
<xml_diff>
--- a/workshops/2019_10_23/Präsentation 23_10_2019.pptx
+++ b/workshops/2019_10_23/Präsentation 23_10_2019.pptx
@@ -5,21 +5,24 @@
     <p:sldMasterId id="2147483648" r:id="rId1"/>
   </p:sldMasterIdLst>
   <p:notesMasterIdLst>
-    <p:notesMasterId r:id="rId14"/>
+    <p:notesMasterId r:id="rId17"/>
   </p:notesMasterIdLst>
   <p:sldIdLst>
     <p:sldId id="256" r:id="rId2"/>
     <p:sldId id="257" r:id="rId3"/>
-    <p:sldId id="268" r:id="rId4"/>
-    <p:sldId id="273" r:id="rId5"/>
-    <p:sldId id="274" r:id="rId6"/>
-    <p:sldId id="269" r:id="rId7"/>
-    <p:sldId id="277" r:id="rId8"/>
-    <p:sldId id="270" r:id="rId9"/>
-    <p:sldId id="271" r:id="rId10"/>
-    <p:sldId id="272" r:id="rId11"/>
-    <p:sldId id="275" r:id="rId12"/>
-    <p:sldId id="276" r:id="rId13"/>
+    <p:sldId id="279" r:id="rId4"/>
+    <p:sldId id="278" r:id="rId5"/>
+    <p:sldId id="280" r:id="rId6"/>
+    <p:sldId id="268" r:id="rId7"/>
+    <p:sldId id="273" r:id="rId8"/>
+    <p:sldId id="274" r:id="rId9"/>
+    <p:sldId id="269" r:id="rId10"/>
+    <p:sldId id="277" r:id="rId11"/>
+    <p:sldId id="270" r:id="rId12"/>
+    <p:sldId id="271" r:id="rId13"/>
+    <p:sldId id="272" r:id="rId14"/>
+    <p:sldId id="275" r:id="rId15"/>
+    <p:sldId id="276" r:id="rId16"/>
   </p:sldIdLst>
   <p:sldSz cx="12192000" cy="6858000"/>
   <p:notesSz cx="6858000" cy="9144000"/>
@@ -366,7 +369,7 @@
           <a:p>
             <a:fld id="{11428D28-81C1-40CB-B8E7-71448353209F}" type="slidenum">
               <a:rPr lang="de-DE" smtClean="0"/>
-              <a:t>‹Nr.›</a:t>
+              <a:t>‹#›</a:t>
             </a:fld>
             <a:endParaRPr lang="de-DE"/>
           </a:p>
@@ -639,7 +642,7 @@
     </p:spTree>
     <p:extLst>
       <p:ext uri="{BB962C8B-B14F-4D97-AF65-F5344CB8AC3E}">
-        <p14:creationId xmlns:p14="http://schemas.microsoft.com/office/powerpoint/2010/main" val="3300451514"/>
+        <p14:creationId xmlns:p14="http://schemas.microsoft.com/office/powerpoint/2010/main" val="133613382"/>
       </p:ext>
     </p:extLst>
   </p:cSld>
@@ -718,6 +721,267 @@
             <a:fld id="{11428D28-81C1-40CB-B8E7-71448353209F}" type="slidenum">
               <a:rPr lang="de-DE" smtClean="0"/>
               <a:t>12</a:t>
+            </a:fld>
+            <a:endParaRPr lang="de-DE"/>
+          </a:p>
+        </p:txBody>
+      </p:sp>
+    </p:spTree>
+    <p:extLst>
+      <p:ext uri="{BB962C8B-B14F-4D97-AF65-F5344CB8AC3E}">
+        <p14:creationId xmlns:p14="http://schemas.microsoft.com/office/powerpoint/2010/main" val="159180063"/>
+      </p:ext>
+    </p:extLst>
+  </p:cSld>
+  <p:clrMapOvr>
+    <a:masterClrMapping/>
+  </p:clrMapOvr>
+</p:notes>
+</file>
+
+<file path=ppt/notesSlides/notesSlide12.xml><?xml version="1.0" encoding="utf-8"?>
+<p:notes xmlns:a="http://schemas.openxmlformats.org/drawingml/2006/main" xmlns:r="http://schemas.openxmlformats.org/officeDocument/2006/relationships" xmlns:p="http://schemas.openxmlformats.org/presentationml/2006/main">
+  <p:cSld>
+    <p:spTree>
+      <p:nvGrpSpPr>
+        <p:cNvPr id="1" name=""/>
+        <p:cNvGrpSpPr/>
+        <p:nvPr/>
+      </p:nvGrpSpPr>
+      <p:grpSpPr>
+        <a:xfrm>
+          <a:off x="0" y="0"/>
+          <a:ext cx="0" cy="0"/>
+          <a:chOff x="0" y="0"/>
+          <a:chExt cx="0" cy="0"/>
+        </a:xfrm>
+      </p:grpSpPr>
+      <p:sp>
+        <p:nvSpPr>
+          <p:cNvPr id="2" name="Folienbildplatzhalter 1"/>
+          <p:cNvSpPr>
+            <a:spLocks noGrp="1" noRot="1" noChangeAspect="1"/>
+          </p:cNvSpPr>
+          <p:nvPr>
+            <p:ph type="sldImg"/>
+          </p:nvPr>
+        </p:nvSpPr>
+        <p:spPr/>
+      </p:sp>
+      <p:sp>
+        <p:nvSpPr>
+          <p:cNvPr id="3" name="Notizenplatzhalter 2"/>
+          <p:cNvSpPr>
+            <a:spLocks noGrp="1"/>
+          </p:cNvSpPr>
+          <p:nvPr>
+            <p:ph type="body" idx="1"/>
+          </p:nvPr>
+        </p:nvSpPr>
+        <p:spPr/>
+        <p:txBody>
+          <a:bodyPr/>
+          <a:lstStyle/>
+          <a:p>
+            <a:r>
+              <a:rPr lang="de-DE" dirty="0"/>
+              <a:t>Nils</a:t>
+            </a:r>
+          </a:p>
+        </p:txBody>
+      </p:sp>
+      <p:sp>
+        <p:nvSpPr>
+          <p:cNvPr id="4" name="Foliennummernplatzhalter 3"/>
+          <p:cNvSpPr>
+            <a:spLocks noGrp="1"/>
+          </p:cNvSpPr>
+          <p:nvPr>
+            <p:ph type="sldNum" sz="quarter" idx="5"/>
+          </p:nvPr>
+        </p:nvSpPr>
+        <p:spPr/>
+        <p:txBody>
+          <a:bodyPr/>
+          <a:lstStyle/>
+          <a:p>
+            <a:fld id="{11428D28-81C1-40CB-B8E7-71448353209F}" type="slidenum">
+              <a:rPr lang="de-DE" smtClean="0"/>
+              <a:t>13</a:t>
+            </a:fld>
+            <a:endParaRPr lang="de-DE"/>
+          </a:p>
+        </p:txBody>
+      </p:sp>
+    </p:spTree>
+    <p:extLst>
+      <p:ext uri="{BB962C8B-B14F-4D97-AF65-F5344CB8AC3E}">
+        <p14:creationId xmlns:p14="http://schemas.microsoft.com/office/powerpoint/2010/main" val="1251476281"/>
+      </p:ext>
+    </p:extLst>
+  </p:cSld>
+  <p:clrMapOvr>
+    <a:masterClrMapping/>
+  </p:clrMapOvr>
+</p:notes>
+</file>
+
+<file path=ppt/notesSlides/notesSlide13.xml><?xml version="1.0" encoding="utf-8"?>
+<p:notes xmlns:a="http://schemas.openxmlformats.org/drawingml/2006/main" xmlns:r="http://schemas.openxmlformats.org/officeDocument/2006/relationships" xmlns:p="http://schemas.openxmlformats.org/presentationml/2006/main">
+  <p:cSld>
+    <p:spTree>
+      <p:nvGrpSpPr>
+        <p:cNvPr id="1" name=""/>
+        <p:cNvGrpSpPr/>
+        <p:nvPr/>
+      </p:nvGrpSpPr>
+      <p:grpSpPr>
+        <a:xfrm>
+          <a:off x="0" y="0"/>
+          <a:ext cx="0" cy="0"/>
+          <a:chOff x="0" y="0"/>
+          <a:chExt cx="0" cy="0"/>
+        </a:xfrm>
+      </p:grpSpPr>
+      <p:sp>
+        <p:nvSpPr>
+          <p:cNvPr id="2" name="Folienbildplatzhalter 1"/>
+          <p:cNvSpPr>
+            <a:spLocks noGrp="1" noRot="1" noChangeAspect="1"/>
+          </p:cNvSpPr>
+          <p:nvPr>
+            <p:ph type="sldImg"/>
+          </p:nvPr>
+        </p:nvSpPr>
+        <p:spPr/>
+      </p:sp>
+      <p:sp>
+        <p:nvSpPr>
+          <p:cNvPr id="3" name="Notizenplatzhalter 2"/>
+          <p:cNvSpPr>
+            <a:spLocks noGrp="1"/>
+          </p:cNvSpPr>
+          <p:nvPr>
+            <p:ph type="body" idx="1"/>
+          </p:nvPr>
+        </p:nvSpPr>
+        <p:spPr/>
+        <p:txBody>
+          <a:bodyPr/>
+          <a:lstStyle/>
+          <a:p>
+            <a:r>
+              <a:rPr lang="de-DE" dirty="0"/>
+              <a:t>Nils</a:t>
+            </a:r>
+          </a:p>
+        </p:txBody>
+      </p:sp>
+      <p:sp>
+        <p:nvSpPr>
+          <p:cNvPr id="4" name="Foliennummernplatzhalter 3"/>
+          <p:cNvSpPr>
+            <a:spLocks noGrp="1"/>
+          </p:cNvSpPr>
+          <p:nvPr>
+            <p:ph type="sldNum" sz="quarter" idx="5"/>
+          </p:nvPr>
+        </p:nvSpPr>
+        <p:spPr/>
+        <p:txBody>
+          <a:bodyPr/>
+          <a:lstStyle/>
+          <a:p>
+            <a:fld id="{11428D28-81C1-40CB-B8E7-71448353209F}" type="slidenum">
+              <a:rPr lang="de-DE" smtClean="0"/>
+              <a:t>14</a:t>
+            </a:fld>
+            <a:endParaRPr lang="de-DE"/>
+          </a:p>
+        </p:txBody>
+      </p:sp>
+    </p:spTree>
+    <p:extLst>
+      <p:ext uri="{BB962C8B-B14F-4D97-AF65-F5344CB8AC3E}">
+        <p14:creationId xmlns:p14="http://schemas.microsoft.com/office/powerpoint/2010/main" val="3300451514"/>
+      </p:ext>
+    </p:extLst>
+  </p:cSld>
+  <p:clrMapOvr>
+    <a:masterClrMapping/>
+  </p:clrMapOvr>
+</p:notes>
+</file>
+
+<file path=ppt/notesSlides/notesSlide14.xml><?xml version="1.0" encoding="utf-8"?>
+<p:notes xmlns:a="http://schemas.openxmlformats.org/drawingml/2006/main" xmlns:r="http://schemas.openxmlformats.org/officeDocument/2006/relationships" xmlns:p="http://schemas.openxmlformats.org/presentationml/2006/main">
+  <p:cSld>
+    <p:spTree>
+      <p:nvGrpSpPr>
+        <p:cNvPr id="1" name=""/>
+        <p:cNvGrpSpPr/>
+        <p:nvPr/>
+      </p:nvGrpSpPr>
+      <p:grpSpPr>
+        <a:xfrm>
+          <a:off x="0" y="0"/>
+          <a:ext cx="0" cy="0"/>
+          <a:chOff x="0" y="0"/>
+          <a:chExt cx="0" cy="0"/>
+        </a:xfrm>
+      </p:grpSpPr>
+      <p:sp>
+        <p:nvSpPr>
+          <p:cNvPr id="2" name="Folienbildplatzhalter 1"/>
+          <p:cNvSpPr>
+            <a:spLocks noGrp="1" noRot="1" noChangeAspect="1"/>
+          </p:cNvSpPr>
+          <p:nvPr>
+            <p:ph type="sldImg"/>
+          </p:nvPr>
+        </p:nvSpPr>
+        <p:spPr/>
+      </p:sp>
+      <p:sp>
+        <p:nvSpPr>
+          <p:cNvPr id="3" name="Notizenplatzhalter 2"/>
+          <p:cNvSpPr>
+            <a:spLocks noGrp="1"/>
+          </p:cNvSpPr>
+          <p:nvPr>
+            <p:ph type="body" idx="1"/>
+          </p:nvPr>
+        </p:nvSpPr>
+        <p:spPr/>
+        <p:txBody>
+          <a:bodyPr/>
+          <a:lstStyle/>
+          <a:p>
+            <a:r>
+              <a:rPr lang="de-DE" dirty="0"/>
+              <a:t>Nils</a:t>
+            </a:r>
+          </a:p>
+        </p:txBody>
+      </p:sp>
+      <p:sp>
+        <p:nvSpPr>
+          <p:cNvPr id="4" name="Foliennummernplatzhalter 3"/>
+          <p:cNvSpPr>
+            <a:spLocks noGrp="1"/>
+          </p:cNvSpPr>
+          <p:nvPr>
+            <p:ph type="sldNum" sz="quarter" idx="5"/>
+          </p:nvPr>
+        </p:nvSpPr>
+        <p:spPr/>
+        <p:txBody>
+          <a:bodyPr/>
+          <a:lstStyle/>
+          <a:p>
+            <a:fld id="{11428D28-81C1-40CB-B8E7-71448353209F}" type="slidenum">
+              <a:rPr lang="de-DE" smtClean="0"/>
+              <a:t>15</a:t>
             </a:fld>
             <a:endParaRPr lang="de-DE"/>
           </a:p>
@@ -813,7 +1077,7 @@
     </p:spTree>
     <p:extLst>
       <p:ext uri="{BB962C8B-B14F-4D97-AF65-F5344CB8AC3E}">
-        <p14:creationId xmlns:p14="http://schemas.microsoft.com/office/powerpoint/2010/main" val="3691625391"/>
+        <p14:creationId xmlns:p14="http://schemas.microsoft.com/office/powerpoint/2010/main" val="3797272021"/>
       </p:ext>
     </p:extLst>
   </p:cSld>
@@ -900,7 +1164,7 @@
     </p:spTree>
     <p:extLst>
       <p:ext uri="{BB962C8B-B14F-4D97-AF65-F5344CB8AC3E}">
-        <p14:creationId xmlns:p14="http://schemas.microsoft.com/office/powerpoint/2010/main" val="876140724"/>
+        <p14:creationId xmlns:p14="http://schemas.microsoft.com/office/powerpoint/2010/main" val="69916892"/>
       </p:ext>
     </p:extLst>
   </p:cSld>
@@ -987,7 +1251,7 @@
     </p:spTree>
     <p:extLst>
       <p:ext uri="{BB962C8B-B14F-4D97-AF65-F5344CB8AC3E}">
-        <p14:creationId xmlns:p14="http://schemas.microsoft.com/office/powerpoint/2010/main" val="986039418"/>
+        <p14:creationId xmlns:p14="http://schemas.microsoft.com/office/powerpoint/2010/main" val="2644957769"/>
       </p:ext>
     </p:extLst>
   </p:cSld>
@@ -1074,7 +1338,7 @@
     </p:spTree>
     <p:extLst>
       <p:ext uri="{BB962C8B-B14F-4D97-AF65-F5344CB8AC3E}">
-        <p14:creationId xmlns:p14="http://schemas.microsoft.com/office/powerpoint/2010/main" val="986410664"/>
+        <p14:creationId xmlns:p14="http://schemas.microsoft.com/office/powerpoint/2010/main" val="3691625391"/>
       </p:ext>
     </p:extLst>
   </p:cSld>
@@ -1161,7 +1425,7 @@
     </p:spTree>
     <p:extLst>
       <p:ext uri="{BB962C8B-B14F-4D97-AF65-F5344CB8AC3E}">
-        <p14:creationId xmlns:p14="http://schemas.microsoft.com/office/powerpoint/2010/main" val="2584944711"/>
+        <p14:creationId xmlns:p14="http://schemas.microsoft.com/office/powerpoint/2010/main" val="876140724"/>
       </p:ext>
     </p:extLst>
   </p:cSld>
@@ -1248,7 +1512,7 @@
     </p:spTree>
     <p:extLst>
       <p:ext uri="{BB962C8B-B14F-4D97-AF65-F5344CB8AC3E}">
-        <p14:creationId xmlns:p14="http://schemas.microsoft.com/office/powerpoint/2010/main" val="133613382"/>
+        <p14:creationId xmlns:p14="http://schemas.microsoft.com/office/powerpoint/2010/main" val="986039418"/>
       </p:ext>
     </p:extLst>
   </p:cSld>
@@ -1335,7 +1599,7 @@
     </p:spTree>
     <p:extLst>
       <p:ext uri="{BB962C8B-B14F-4D97-AF65-F5344CB8AC3E}">
-        <p14:creationId xmlns:p14="http://schemas.microsoft.com/office/powerpoint/2010/main" val="159180063"/>
+        <p14:creationId xmlns:p14="http://schemas.microsoft.com/office/powerpoint/2010/main" val="986410664"/>
       </p:ext>
     </p:extLst>
   </p:cSld>
@@ -1422,7 +1686,7 @@
     </p:spTree>
     <p:extLst>
       <p:ext uri="{BB962C8B-B14F-4D97-AF65-F5344CB8AC3E}">
-        <p14:creationId xmlns:p14="http://schemas.microsoft.com/office/powerpoint/2010/main" val="1251476281"/>
+        <p14:creationId xmlns:p14="http://schemas.microsoft.com/office/powerpoint/2010/main" val="2584944711"/>
       </p:ext>
     </p:extLst>
   </p:cSld>
@@ -1633,7 +1897,7 @@
           <a:p>
             <a:fld id="{A312F13E-1E93-4F6D-B514-E99E3F42818D}" type="slidenum">
               <a:rPr lang="de-DE" smtClean="0"/>
-              <a:t>‹Nr.›</a:t>
+              <a:t>‹#›</a:t>
             </a:fld>
             <a:endParaRPr lang="de-DE"/>
           </a:p>
@@ -1831,7 +2095,7 @@
           <a:p>
             <a:fld id="{A312F13E-1E93-4F6D-B514-E99E3F42818D}" type="slidenum">
               <a:rPr lang="de-DE" smtClean="0"/>
-              <a:t>‹Nr.›</a:t>
+              <a:t>‹#›</a:t>
             </a:fld>
             <a:endParaRPr lang="de-DE"/>
           </a:p>
@@ -2039,7 +2303,7 @@
           <a:p>
             <a:fld id="{A312F13E-1E93-4F6D-B514-E99E3F42818D}" type="slidenum">
               <a:rPr lang="de-DE" smtClean="0"/>
-              <a:t>‹Nr.›</a:t>
+              <a:t>‹#›</a:t>
             </a:fld>
             <a:endParaRPr lang="de-DE"/>
           </a:p>
@@ -2237,7 +2501,7 @@
           <a:p>
             <a:fld id="{A312F13E-1E93-4F6D-B514-E99E3F42818D}" type="slidenum">
               <a:rPr lang="de-DE" smtClean="0"/>
-              <a:t>‹Nr.›</a:t>
+              <a:t>‹#›</a:t>
             </a:fld>
             <a:endParaRPr lang="de-DE"/>
           </a:p>
@@ -2512,7 +2776,7 @@
           <a:p>
             <a:fld id="{A312F13E-1E93-4F6D-B514-E99E3F42818D}" type="slidenum">
               <a:rPr lang="de-DE" smtClean="0"/>
-              <a:t>‹Nr.›</a:t>
+              <a:t>‹#›</a:t>
             </a:fld>
             <a:endParaRPr lang="de-DE"/>
           </a:p>
@@ -2777,7 +3041,7 @@
           <a:p>
             <a:fld id="{A312F13E-1E93-4F6D-B514-E99E3F42818D}" type="slidenum">
               <a:rPr lang="de-DE" smtClean="0"/>
-              <a:t>‹Nr.›</a:t>
+              <a:t>‹#›</a:t>
             </a:fld>
             <a:endParaRPr lang="de-DE"/>
           </a:p>
@@ -3189,7 +3453,7 @@
           <a:p>
             <a:fld id="{A312F13E-1E93-4F6D-B514-E99E3F42818D}" type="slidenum">
               <a:rPr lang="de-DE" smtClean="0"/>
-              <a:t>‹Nr.›</a:t>
+              <a:t>‹#›</a:t>
             </a:fld>
             <a:endParaRPr lang="de-DE"/>
           </a:p>
@@ -3330,7 +3594,7 @@
           <a:p>
             <a:fld id="{A312F13E-1E93-4F6D-B514-E99E3F42818D}" type="slidenum">
               <a:rPr lang="de-DE" smtClean="0"/>
-              <a:t>‹Nr.›</a:t>
+              <a:t>‹#›</a:t>
             </a:fld>
             <a:endParaRPr lang="de-DE"/>
           </a:p>
@@ -3443,7 +3707,7 @@
           <a:p>
             <a:fld id="{A312F13E-1E93-4F6D-B514-E99E3F42818D}" type="slidenum">
               <a:rPr lang="de-DE" smtClean="0"/>
-              <a:t>‹Nr.›</a:t>
+              <a:t>‹#›</a:t>
             </a:fld>
             <a:endParaRPr lang="de-DE"/>
           </a:p>
@@ -3754,7 +4018,7 @@
           <a:p>
             <a:fld id="{A312F13E-1E93-4F6D-B514-E99E3F42818D}" type="slidenum">
               <a:rPr lang="de-DE" smtClean="0"/>
-              <a:t>‹Nr.›</a:t>
+              <a:t>‹#›</a:t>
             </a:fld>
             <a:endParaRPr lang="de-DE"/>
           </a:p>
@@ -4042,7 +4306,7 @@
           <a:p>
             <a:fld id="{A312F13E-1E93-4F6D-B514-E99E3F42818D}" type="slidenum">
               <a:rPr lang="de-DE" smtClean="0"/>
-              <a:t>‹Nr.›</a:t>
+              <a:t>‹#›</a:t>
             </a:fld>
             <a:endParaRPr lang="de-DE"/>
           </a:p>
@@ -4328,7 +4592,7 @@
           <a:p>
             <a:fld id="{A312F13E-1E93-4F6D-B514-E99E3F42818D}" type="slidenum">
               <a:rPr lang="de-DE" smtClean="0"/>
-              <a:t>‹Nr.›</a:t>
+              <a:t>‹#›</a:t>
             </a:fld>
             <a:endParaRPr lang="de-DE"/>
           </a:p>
@@ -4764,7 +5028,7 @@
           <a:p>
             <a:r>
               <a:rPr lang="de-DE" dirty="0"/>
-              <a:t>Datemodell Baum</a:t>
+              <a:t>Schaltplan - Stand</a:t>
             </a:r>
           </a:p>
         </p:txBody>
@@ -4789,32 +5053,6 @@
         <p:txBody>
           <a:bodyPr/>
           <a:lstStyle/>
-          <a:p>
-            <a:r>
-              <a:rPr lang="de-DE" dirty="0"/>
-              <a:t>Berechnung der „Verschmutzung“ in letztem Intervall</a:t>
-            </a:r>
-          </a:p>
-          <a:p>
-            <a:r>
-              <a:rPr lang="de-DE" dirty="0"/>
-              <a:t>Verzögerung </a:t>
-            </a:r>
-          </a:p>
-          <a:p>
-            <a:pPr lvl="1"/>
-            <a:r>
-              <a:rPr lang="de-DE" dirty="0"/>
-              <a:t>Bei Auswirkung</a:t>
-            </a:r>
-          </a:p>
-          <a:p>
-            <a:pPr lvl="1"/>
-            <a:r>
-              <a:rPr lang="de-DE" dirty="0"/>
-              <a:t>Und Regeneration</a:t>
-            </a:r>
-          </a:p>
           <a:p>
             <a:pPr marL="457200" lvl="1" indent="0">
               <a:buNone/>
@@ -4829,10 +5067,46 @@
           </a:p>
         </p:txBody>
       </p:sp>
+      <p:pic>
+        <p:nvPicPr>
+          <p:cNvPr id="6" name="Grafik 5" descr="Ein Bild, das Tisch, Parkplatz, weiß enthält.&#10;&#10;Automatisch generierte Beschreibung">
+            <a:extLst>
+              <a:ext uri="{FF2B5EF4-FFF2-40B4-BE49-F238E27FC236}">
+                <a16:creationId xmlns:a16="http://schemas.microsoft.com/office/drawing/2014/main" id="{3A88F726-91CC-44B8-A0ED-607601C10578}"/>
+              </a:ext>
+            </a:extLst>
+          </p:cNvPr>
+          <p:cNvPicPr>
+            <a:picLocks noChangeAspect="1"/>
+          </p:cNvPicPr>
+          <p:nvPr/>
+        </p:nvPicPr>
+        <p:blipFill>
+          <a:blip r:embed="rId3">
+            <a:extLst>
+              <a:ext uri="{28A0092B-C50C-407E-A947-70E740481C1C}">
+                <a14:useLocalDpi xmlns:a14="http://schemas.microsoft.com/office/drawing/2010/main" val="0"/>
+              </a:ext>
+            </a:extLst>
+          </a:blip>
+          <a:stretch>
+            <a:fillRect/>
+          </a:stretch>
+        </p:blipFill>
+        <p:spPr>
+          <a:xfrm>
+            <a:off x="3219563" y="1322641"/>
+            <a:ext cx="5752873" cy="5367408"/>
+          </a:xfrm>
+          <a:prstGeom prst="rect">
+            <a:avLst/>
+          </a:prstGeom>
+        </p:spPr>
+      </p:pic>
     </p:spTree>
     <p:extLst>
       <p:ext uri="{BB962C8B-B14F-4D97-AF65-F5344CB8AC3E}">
-        <p14:creationId xmlns:p14="http://schemas.microsoft.com/office/powerpoint/2010/main" val="1682709236"/>
+        <p14:creationId xmlns:p14="http://schemas.microsoft.com/office/powerpoint/2010/main" val="1595897628"/>
       </p:ext>
     </p:extLst>
   </p:cSld>
@@ -4882,6 +5156,359 @@
           <a:p>
             <a:r>
               <a:rPr lang="de-DE" dirty="0"/>
+              <a:t>Schaltplan – Herausforderungen</a:t>
+            </a:r>
+          </a:p>
+        </p:txBody>
+      </p:sp>
+      <p:sp>
+        <p:nvSpPr>
+          <p:cNvPr id="3" name="Inhaltsplatzhalter 2">
+            <a:extLst>
+              <a:ext uri="{FF2B5EF4-FFF2-40B4-BE49-F238E27FC236}">
+                <a16:creationId xmlns:a16="http://schemas.microsoft.com/office/drawing/2014/main" id="{0C400920-B351-4D1F-BA2C-AEBB87CD9379}"/>
+              </a:ext>
+            </a:extLst>
+          </p:cNvPr>
+          <p:cNvSpPr>
+            <a:spLocks noGrp="1"/>
+          </p:cNvSpPr>
+          <p:nvPr>
+            <p:ph idx="1"/>
+          </p:nvPr>
+        </p:nvSpPr>
+        <p:spPr/>
+        <p:txBody>
+          <a:bodyPr/>
+          <a:lstStyle/>
+          <a:p>
+            <a:r>
+              <a:rPr lang="de-DE" dirty="0"/>
+              <a:t>Aktueller Microcontroller ungeeignet</a:t>
+            </a:r>
+          </a:p>
+          <a:p>
+            <a:pPr lvl="1"/>
+            <a:r>
+              <a:rPr lang="de-DE" dirty="0"/>
+              <a:t>Max. 3.3V vs 5V</a:t>
+            </a:r>
+          </a:p>
+          <a:p>
+            <a:pPr lvl="1"/>
+            <a:r>
+              <a:rPr lang="de-DE" dirty="0"/>
+              <a:t>Hall-Sensor benötigt mehr Volt</a:t>
+            </a:r>
+          </a:p>
+          <a:p>
+            <a:pPr lvl="1"/>
+            <a:r>
+              <a:rPr lang="de-DE" dirty="0"/>
+              <a:t>Kein  Datenblatt zu Sensoren</a:t>
+            </a:r>
+          </a:p>
+          <a:p>
+            <a:r>
+              <a:rPr lang="de-DE" dirty="0"/>
+              <a:t>Daher bislang keine Tests möglich</a:t>
+            </a:r>
+          </a:p>
+          <a:p>
+            <a:endParaRPr lang="de-DE" dirty="0"/>
+          </a:p>
+          <a:p>
+            <a:r>
+              <a:rPr lang="de-DE" dirty="0"/>
+              <a:t>-&gt; Warten auf Hardware</a:t>
+            </a:r>
+          </a:p>
+          <a:p>
+            <a:endParaRPr lang="de-DE" dirty="0"/>
+          </a:p>
+          <a:p>
+            <a:pPr marL="457200" lvl="1" indent="0">
+              <a:buNone/>
+            </a:pPr>
+            <a:endParaRPr lang="de-DE" dirty="0"/>
+          </a:p>
+          <a:p>
+            <a:pPr marL="457200" lvl="1" indent="0">
+              <a:buNone/>
+            </a:pPr>
+            <a:endParaRPr lang="de-DE" dirty="0"/>
+          </a:p>
+        </p:txBody>
+      </p:sp>
+    </p:spTree>
+    <p:extLst>
+      <p:ext uri="{BB962C8B-B14F-4D97-AF65-F5344CB8AC3E}">
+        <p14:creationId xmlns:p14="http://schemas.microsoft.com/office/powerpoint/2010/main" val="3841598285"/>
+      </p:ext>
+    </p:extLst>
+  </p:cSld>
+  <p:clrMapOvr>
+    <a:masterClrMapping/>
+  </p:clrMapOvr>
+</p:sld>
+</file>
+
+<file path=ppt/slides/slide12.xml><?xml version="1.0" encoding="utf-8"?>
+<p:sld xmlns:a="http://schemas.openxmlformats.org/drawingml/2006/main" xmlns:r="http://schemas.openxmlformats.org/officeDocument/2006/relationships" xmlns:p="http://schemas.openxmlformats.org/presentationml/2006/main">
+  <p:cSld>
+    <p:spTree>
+      <p:nvGrpSpPr>
+        <p:cNvPr id="1" name=""/>
+        <p:cNvGrpSpPr/>
+        <p:nvPr/>
+      </p:nvGrpSpPr>
+      <p:grpSpPr>
+        <a:xfrm>
+          <a:off x="0" y="0"/>
+          <a:ext cx="0" cy="0"/>
+          <a:chOff x="0" y="0"/>
+          <a:chExt cx="0" cy="0"/>
+        </a:xfrm>
+      </p:grpSpPr>
+      <p:sp>
+        <p:nvSpPr>
+          <p:cNvPr id="2" name="Titel 1">
+            <a:extLst>
+              <a:ext uri="{FF2B5EF4-FFF2-40B4-BE49-F238E27FC236}">
+                <a16:creationId xmlns:a16="http://schemas.microsoft.com/office/drawing/2014/main" id="{0992496D-39C0-4746-8D18-2B7492811CAF}"/>
+              </a:ext>
+            </a:extLst>
+          </p:cNvPr>
+          <p:cNvSpPr>
+            <a:spLocks noGrp="1"/>
+          </p:cNvSpPr>
+          <p:nvPr>
+            <p:ph type="title"/>
+          </p:nvPr>
+        </p:nvSpPr>
+        <p:spPr/>
+        <p:txBody>
+          <a:bodyPr/>
+          <a:lstStyle/>
+          <a:p>
+            <a:r>
+              <a:rPr lang="de-DE" dirty="0"/>
+              <a:t>Datemodell Fahrzeuge</a:t>
+            </a:r>
+          </a:p>
+        </p:txBody>
+      </p:sp>
+      <p:sp>
+        <p:nvSpPr>
+          <p:cNvPr id="3" name="Inhaltsplatzhalter 2">
+            <a:extLst>
+              <a:ext uri="{FF2B5EF4-FFF2-40B4-BE49-F238E27FC236}">
+                <a16:creationId xmlns:a16="http://schemas.microsoft.com/office/drawing/2014/main" id="{0C400920-B351-4D1F-BA2C-AEBB87CD9379}"/>
+              </a:ext>
+            </a:extLst>
+          </p:cNvPr>
+          <p:cNvSpPr>
+            <a:spLocks noGrp="1"/>
+          </p:cNvSpPr>
+          <p:nvPr>
+            <p:ph idx="1"/>
+          </p:nvPr>
+        </p:nvSpPr>
+        <p:spPr/>
+        <p:txBody>
+          <a:bodyPr/>
+          <a:lstStyle/>
+          <a:p>
+            <a:r>
+              <a:rPr lang="de-DE" dirty="0"/>
+              <a:t>BILD(JSON)</a:t>
+            </a:r>
+          </a:p>
+          <a:p>
+            <a:pPr marL="457200" lvl="1" indent="0">
+              <a:buNone/>
+            </a:pPr>
+            <a:endParaRPr lang="de-DE" dirty="0"/>
+          </a:p>
+          <a:p>
+            <a:pPr marL="457200" lvl="1" indent="0">
+              <a:buNone/>
+            </a:pPr>
+            <a:endParaRPr lang="de-DE" dirty="0"/>
+          </a:p>
+        </p:txBody>
+      </p:sp>
+    </p:spTree>
+    <p:extLst>
+      <p:ext uri="{BB962C8B-B14F-4D97-AF65-F5344CB8AC3E}">
+        <p14:creationId xmlns:p14="http://schemas.microsoft.com/office/powerpoint/2010/main" val="1309895707"/>
+      </p:ext>
+    </p:extLst>
+  </p:cSld>
+  <p:clrMapOvr>
+    <a:masterClrMapping/>
+  </p:clrMapOvr>
+</p:sld>
+</file>
+
+<file path=ppt/slides/slide13.xml><?xml version="1.0" encoding="utf-8"?>
+<p:sld xmlns:a="http://schemas.openxmlformats.org/drawingml/2006/main" xmlns:r="http://schemas.openxmlformats.org/officeDocument/2006/relationships" xmlns:p="http://schemas.openxmlformats.org/presentationml/2006/main">
+  <p:cSld>
+    <p:spTree>
+      <p:nvGrpSpPr>
+        <p:cNvPr id="1" name=""/>
+        <p:cNvGrpSpPr/>
+        <p:nvPr/>
+      </p:nvGrpSpPr>
+      <p:grpSpPr>
+        <a:xfrm>
+          <a:off x="0" y="0"/>
+          <a:ext cx="0" cy="0"/>
+          <a:chOff x="0" y="0"/>
+          <a:chExt cx="0" cy="0"/>
+        </a:xfrm>
+      </p:grpSpPr>
+      <p:sp>
+        <p:nvSpPr>
+          <p:cNvPr id="2" name="Titel 1">
+            <a:extLst>
+              <a:ext uri="{FF2B5EF4-FFF2-40B4-BE49-F238E27FC236}">
+                <a16:creationId xmlns:a16="http://schemas.microsoft.com/office/drawing/2014/main" id="{0992496D-39C0-4746-8D18-2B7492811CAF}"/>
+              </a:ext>
+            </a:extLst>
+          </p:cNvPr>
+          <p:cNvSpPr>
+            <a:spLocks noGrp="1"/>
+          </p:cNvSpPr>
+          <p:nvPr>
+            <p:ph type="title"/>
+          </p:nvPr>
+        </p:nvSpPr>
+        <p:spPr/>
+        <p:txBody>
+          <a:bodyPr/>
+          <a:lstStyle/>
+          <a:p>
+            <a:r>
+              <a:rPr lang="de-DE" dirty="0"/>
+              <a:t>Datemodell Baum</a:t>
+            </a:r>
+          </a:p>
+        </p:txBody>
+      </p:sp>
+      <p:sp>
+        <p:nvSpPr>
+          <p:cNvPr id="3" name="Inhaltsplatzhalter 2">
+            <a:extLst>
+              <a:ext uri="{FF2B5EF4-FFF2-40B4-BE49-F238E27FC236}">
+                <a16:creationId xmlns:a16="http://schemas.microsoft.com/office/drawing/2014/main" id="{0C400920-B351-4D1F-BA2C-AEBB87CD9379}"/>
+              </a:ext>
+            </a:extLst>
+          </p:cNvPr>
+          <p:cNvSpPr>
+            <a:spLocks noGrp="1"/>
+          </p:cNvSpPr>
+          <p:nvPr>
+            <p:ph idx="1"/>
+          </p:nvPr>
+        </p:nvSpPr>
+        <p:spPr/>
+        <p:txBody>
+          <a:bodyPr/>
+          <a:lstStyle/>
+          <a:p>
+            <a:r>
+              <a:rPr lang="de-DE" dirty="0"/>
+              <a:t>Berechnung der „Verschmutzung“ in letztem Intervall</a:t>
+            </a:r>
+          </a:p>
+          <a:p>
+            <a:r>
+              <a:rPr lang="de-DE" dirty="0"/>
+              <a:t>Verzögerung </a:t>
+            </a:r>
+          </a:p>
+          <a:p>
+            <a:pPr lvl="1"/>
+            <a:r>
+              <a:rPr lang="de-DE" dirty="0"/>
+              <a:t>Bei Auswirkung</a:t>
+            </a:r>
+          </a:p>
+          <a:p>
+            <a:pPr lvl="1"/>
+            <a:r>
+              <a:rPr lang="de-DE" dirty="0"/>
+              <a:t>Und Regeneration</a:t>
+            </a:r>
+          </a:p>
+          <a:p>
+            <a:pPr marL="457200" lvl="1" indent="0">
+              <a:buNone/>
+            </a:pPr>
+            <a:endParaRPr lang="de-DE" dirty="0"/>
+          </a:p>
+          <a:p>
+            <a:pPr marL="457200" lvl="1" indent="0">
+              <a:buNone/>
+            </a:pPr>
+            <a:endParaRPr lang="de-DE" dirty="0"/>
+          </a:p>
+        </p:txBody>
+      </p:sp>
+    </p:spTree>
+    <p:extLst>
+      <p:ext uri="{BB962C8B-B14F-4D97-AF65-F5344CB8AC3E}">
+        <p14:creationId xmlns:p14="http://schemas.microsoft.com/office/powerpoint/2010/main" val="1682709236"/>
+      </p:ext>
+    </p:extLst>
+  </p:cSld>
+  <p:clrMapOvr>
+    <a:masterClrMapping/>
+  </p:clrMapOvr>
+</p:sld>
+</file>
+
+<file path=ppt/slides/slide14.xml><?xml version="1.0" encoding="utf-8"?>
+<p:sld xmlns:a="http://schemas.openxmlformats.org/drawingml/2006/main" xmlns:r="http://schemas.openxmlformats.org/officeDocument/2006/relationships" xmlns:p="http://schemas.openxmlformats.org/presentationml/2006/main">
+  <p:cSld>
+    <p:spTree>
+      <p:nvGrpSpPr>
+        <p:cNvPr id="1" name=""/>
+        <p:cNvGrpSpPr/>
+        <p:nvPr/>
+      </p:nvGrpSpPr>
+      <p:grpSpPr>
+        <a:xfrm>
+          <a:off x="0" y="0"/>
+          <a:ext cx="0" cy="0"/>
+          <a:chOff x="0" y="0"/>
+          <a:chExt cx="0" cy="0"/>
+        </a:xfrm>
+      </p:grpSpPr>
+      <p:sp>
+        <p:nvSpPr>
+          <p:cNvPr id="2" name="Titel 1">
+            <a:extLst>
+              <a:ext uri="{FF2B5EF4-FFF2-40B4-BE49-F238E27FC236}">
+                <a16:creationId xmlns:a16="http://schemas.microsoft.com/office/drawing/2014/main" id="{0992496D-39C0-4746-8D18-2B7492811CAF}"/>
+              </a:ext>
+            </a:extLst>
+          </p:cNvPr>
+          <p:cNvSpPr>
+            <a:spLocks noGrp="1"/>
+          </p:cNvSpPr>
+          <p:nvPr>
+            <p:ph type="title"/>
+          </p:nvPr>
+        </p:nvSpPr>
+        <p:spPr/>
+        <p:txBody>
+          <a:bodyPr/>
+          <a:lstStyle/>
+          <a:p>
+            <a:r>
+              <a:rPr lang="de-DE" dirty="0"/>
               <a:t>Untergrund</a:t>
             </a:r>
           </a:p>
@@ -4959,7 +5586,7 @@
 </p:sld>
 </file>
 
-<file path=ppt/slides/slide12.xml><?xml version="1.0" encoding="utf-8"?>
+<file path=ppt/slides/slide15.xml><?xml version="1.0" encoding="utf-8"?>
 <p:sld xmlns:a="http://schemas.openxmlformats.org/drawingml/2006/main" xmlns:r="http://schemas.openxmlformats.org/officeDocument/2006/relationships" xmlns:p="http://schemas.openxmlformats.org/presentationml/2006/main">
   <p:cSld>
     <p:spTree>
@@ -5138,43 +5765,131 @@
           </a:p>
         </p:txBody>
       </p:sp>
-      <p:sp>
-        <p:nvSpPr>
-          <p:cNvPr id="3" name="Inhaltsplatzhalter 2">
-            <a:extLst>
-              <a:ext uri="{FF2B5EF4-FFF2-40B4-BE49-F238E27FC236}">
-                <a16:creationId xmlns:a16="http://schemas.microsoft.com/office/drawing/2014/main" id="{0C400920-B351-4D1F-BA2C-AEBB87CD9379}"/>
-              </a:ext>
-            </a:extLst>
-          </p:cNvPr>
-          <p:cNvSpPr>
-            <a:spLocks noGrp="1"/>
-          </p:cNvSpPr>
+      <p:pic>
+        <p:nvPicPr>
+          <p:cNvPr id="5" name="Content Placeholder 4">
+            <a:extLst>
+              <a:ext uri="{FF2B5EF4-FFF2-40B4-BE49-F238E27FC236}">
+                <a16:creationId xmlns:a16="http://schemas.microsoft.com/office/drawing/2014/main" id="{BE6F4429-20FE-4AB7-AA08-966CD0378EB0}"/>
+              </a:ext>
+            </a:extLst>
+          </p:cNvPr>
+          <p:cNvPicPr>
+            <a:picLocks noGrp="1" noChangeAspect="1"/>
+          </p:cNvPicPr>
           <p:nvPr>
             <p:ph idx="1"/>
           </p:nvPr>
-        </p:nvSpPr>
-        <p:spPr/>
-        <p:txBody>
-          <a:bodyPr/>
-          <a:lstStyle/>
-          <a:p>
-            <a:pPr marL="457200" lvl="1" indent="0">
-              <a:buNone/>
-            </a:pPr>
-            <a:endParaRPr lang="de-DE" dirty="0"/>
-          </a:p>
-          <a:p>
-            <a:pPr marL="457200" lvl="1" indent="0">
-              <a:buNone/>
-            </a:pPr>
-            <a:r>
-              <a:rPr lang="de-DE" dirty="0"/>
-              <a:t>BILD</a:t>
-            </a:r>
-          </a:p>
-        </p:txBody>
-      </p:sp>
+        </p:nvPicPr>
+        <p:blipFill>
+          <a:blip r:embed="rId3">
+            <a:extLst>
+              <a:ext uri="{28A0092B-C50C-407E-A947-70E740481C1C}">
+                <a14:useLocalDpi xmlns:a14="http://schemas.microsoft.com/office/drawing/2010/main" val="0"/>
+              </a:ext>
+            </a:extLst>
+          </a:blip>
+          <a:stretch>
+            <a:fillRect/>
+          </a:stretch>
+        </p:blipFill>
+        <p:spPr>
+          <a:xfrm>
+            <a:off x="450070" y="1690688"/>
+            <a:ext cx="2446437" cy="4351338"/>
+          </a:xfrm>
+        </p:spPr>
+      </p:pic>
+      <p:sp>
+        <p:nvSpPr>
+          <p:cNvPr id="6" name="Arrow: Right 5">
+            <a:extLst>
+              <a:ext uri="{FF2B5EF4-FFF2-40B4-BE49-F238E27FC236}">
+                <a16:creationId xmlns:a16="http://schemas.microsoft.com/office/drawing/2014/main" id="{AEC2ACAC-A262-4750-9138-2A87955832DE}"/>
+              </a:ext>
+            </a:extLst>
+          </p:cNvPr>
+          <p:cNvSpPr/>
+          <p:nvPr/>
+        </p:nvSpPr>
+        <p:spPr>
+          <a:xfrm>
+            <a:off x="3157839" y="2376714"/>
+            <a:ext cx="2985796" cy="1819469"/>
+          </a:xfrm>
+          <a:prstGeom prst="rightArrow">
+            <a:avLst/>
+          </a:prstGeom>
+          <a:solidFill>
+            <a:schemeClr val="tx1"/>
+          </a:solidFill>
+          <a:ln>
+            <a:solidFill>
+              <a:schemeClr val="tx1"/>
+            </a:solidFill>
+          </a:ln>
+        </p:spPr>
+        <p:style>
+          <a:lnRef idx="2">
+            <a:schemeClr val="accent1">
+              <a:shade val="50000"/>
+            </a:schemeClr>
+          </a:lnRef>
+          <a:fillRef idx="1">
+            <a:schemeClr val="accent1"/>
+          </a:fillRef>
+          <a:effectRef idx="0">
+            <a:schemeClr val="accent1"/>
+          </a:effectRef>
+          <a:fontRef idx="minor">
+            <a:schemeClr val="lt1"/>
+          </a:fontRef>
+        </p:style>
+        <p:txBody>
+          <a:bodyPr rtlCol="0" anchor="ctr"/>
+          <a:lstStyle/>
+          <a:p>
+            <a:pPr algn="ctr"/>
+            <a:endParaRPr lang="en-DE" dirty="0"/>
+          </a:p>
+        </p:txBody>
+      </p:sp>
+      <p:pic>
+        <p:nvPicPr>
+          <p:cNvPr id="8" name="Picture 7">
+            <a:extLst>
+              <a:ext uri="{FF2B5EF4-FFF2-40B4-BE49-F238E27FC236}">
+                <a16:creationId xmlns:a16="http://schemas.microsoft.com/office/drawing/2014/main" id="{1AF0EA06-400F-44A5-AA3F-3298F519BE0D}"/>
+              </a:ext>
+            </a:extLst>
+          </p:cNvPr>
+          <p:cNvPicPr>
+            <a:picLocks noChangeAspect="1"/>
+          </p:cNvPicPr>
+          <p:nvPr/>
+        </p:nvPicPr>
+        <p:blipFill>
+          <a:blip r:embed="rId4">
+            <a:extLst>
+              <a:ext uri="{28A0092B-C50C-407E-A947-70E740481C1C}">
+                <a14:useLocalDpi xmlns:a14="http://schemas.microsoft.com/office/drawing/2010/main" val="0"/>
+              </a:ext>
+            </a:extLst>
+          </a:blip>
+          <a:stretch>
+            <a:fillRect/>
+          </a:stretch>
+        </p:blipFill>
+        <p:spPr>
+          <a:xfrm>
+            <a:off x="6404967" y="1690688"/>
+            <a:ext cx="5612677" cy="3191522"/>
+          </a:xfrm>
+          <a:prstGeom prst="rect">
+            <a:avLst/>
+          </a:prstGeom>
+        </p:spPr>
+      </p:pic>
     </p:spTree>
     <p:extLst>
       <p:ext uri="{BB962C8B-B14F-4D97-AF65-F5344CB8AC3E}">
@@ -5185,6 +5900,111 @@
   <p:clrMapOvr>
     <a:masterClrMapping/>
   </p:clrMapOvr>
+  <p:timing>
+    <p:tnLst>
+      <p:par>
+        <p:cTn id="1" dur="indefinite" restart="never" nodeType="tmRoot">
+          <p:childTnLst>
+            <p:seq concurrent="1" nextAc="seek">
+              <p:cTn id="2" dur="indefinite" nodeType="mainSeq">
+                <p:childTnLst>
+                  <p:par>
+                    <p:cTn id="3" fill="hold">
+                      <p:stCondLst>
+                        <p:cond delay="indefinite"/>
+                      </p:stCondLst>
+                      <p:childTnLst>
+                        <p:par>
+                          <p:cTn id="4" fill="hold">
+                            <p:stCondLst>
+                              <p:cond delay="0"/>
+                            </p:stCondLst>
+                            <p:childTnLst>
+                              <p:par>
+                                <p:cTn id="5" presetID="1" presetClass="entr" presetSubtype="0" fill="hold" nodeType="clickEffect">
+                                  <p:stCondLst>
+                                    <p:cond delay="0"/>
+                                  </p:stCondLst>
+                                  <p:childTnLst>
+                                    <p:set>
+                                      <p:cBhvr>
+                                        <p:cTn id="6" dur="1" fill="hold">
+                                          <p:stCondLst>
+                                            <p:cond delay="0"/>
+                                          </p:stCondLst>
+                                        </p:cTn>
+                                        <p:tgtEl>
+                                          <p:spTgt spid="8"/>
+                                        </p:tgtEl>
+                                        <p:attrNameLst>
+                                          <p:attrName>style.visibility</p:attrName>
+                                        </p:attrNameLst>
+                                      </p:cBhvr>
+                                      <p:to>
+                                        <p:strVal val="visible"/>
+                                      </p:to>
+                                    </p:set>
+                                  </p:childTnLst>
+                                </p:cTn>
+                              </p:par>
+                              <p:par>
+                                <p:cTn id="7" presetID="1" presetClass="entr" presetSubtype="0" fill="hold" grpId="0" nodeType="withEffect">
+                                  <p:stCondLst>
+                                    <p:cond delay="0"/>
+                                  </p:stCondLst>
+                                  <p:childTnLst>
+                                    <p:set>
+                                      <p:cBhvr>
+                                        <p:cTn id="8" dur="1" fill="hold">
+                                          <p:stCondLst>
+                                            <p:cond delay="0"/>
+                                          </p:stCondLst>
+                                        </p:cTn>
+                                        <p:tgtEl>
+                                          <p:spTgt spid="6"/>
+                                        </p:tgtEl>
+                                        <p:attrNameLst>
+                                          <p:attrName>style.visibility</p:attrName>
+                                        </p:attrNameLst>
+                                      </p:cBhvr>
+                                      <p:to>
+                                        <p:strVal val="visible"/>
+                                      </p:to>
+                                    </p:set>
+                                  </p:childTnLst>
+                                </p:cTn>
+                              </p:par>
+                            </p:childTnLst>
+                          </p:cTn>
+                        </p:par>
+                      </p:childTnLst>
+                    </p:cTn>
+                  </p:par>
+                </p:childTnLst>
+              </p:cTn>
+              <p:prevCondLst>
+                <p:cond evt="onPrev" delay="0">
+                  <p:tgtEl>
+                    <p:sldTgt/>
+                  </p:tgtEl>
+                </p:cond>
+              </p:prevCondLst>
+              <p:nextCondLst>
+                <p:cond evt="onNext" delay="0">
+                  <p:tgtEl>
+                    <p:sldTgt/>
+                  </p:tgtEl>
+                </p:cond>
+              </p:nextCondLst>
+            </p:seq>
+          </p:childTnLst>
+        </p:cTn>
+      </p:par>
+    </p:tnLst>
+    <p:bldLst>
+      <p:bldP spid="6" grpId="0" animBg="1"/>
+    </p:bldLst>
+  </p:timing>
 </p:sld>
 </file>
 
@@ -5221,80 +6041,723 @@
             <p:ph type="title"/>
           </p:nvPr>
         </p:nvSpPr>
-        <p:spPr/>
+        <p:spPr>
+          <a:xfrm>
+            <a:off x="838200" y="365125"/>
+            <a:ext cx="10515600" cy="1325563"/>
+          </a:xfrm>
+        </p:spPr>
         <p:txBody>
           <a:bodyPr/>
           <a:lstStyle/>
           <a:p>
             <a:r>
               <a:rPr lang="de-DE" dirty="0"/>
-              <a:t>Fahrzeuge - Herausforderungen</a:t>
-            </a:r>
-          </a:p>
-        </p:txBody>
-      </p:sp>
-      <p:sp>
-        <p:nvSpPr>
-          <p:cNvPr id="3" name="Inhaltsplatzhalter 2">
-            <a:extLst>
-              <a:ext uri="{FF2B5EF4-FFF2-40B4-BE49-F238E27FC236}">
-                <a16:creationId xmlns:a16="http://schemas.microsoft.com/office/drawing/2014/main" id="{0C400920-B351-4D1F-BA2C-AEBB87CD9379}"/>
-              </a:ext>
-            </a:extLst>
-          </p:cNvPr>
-          <p:cNvSpPr>
-            <a:spLocks noGrp="1"/>
-          </p:cNvSpPr>
+              <a:t>Fahrzeuge - Stand</a:t>
+            </a:r>
+          </a:p>
+        </p:txBody>
+      </p:sp>
+      <p:pic>
+        <p:nvPicPr>
+          <p:cNvPr id="9" name="Content Placeholder 8">
+            <a:extLst>
+              <a:ext uri="{FF2B5EF4-FFF2-40B4-BE49-F238E27FC236}">
+                <a16:creationId xmlns:a16="http://schemas.microsoft.com/office/drawing/2014/main" id="{420D9125-DC77-471B-A4D3-807509FBC2CA}"/>
+              </a:ext>
+            </a:extLst>
+          </p:cNvPr>
+          <p:cNvPicPr>
+            <a:picLocks noGrp="1" noChangeAspect="1"/>
+          </p:cNvPicPr>
           <p:nvPr>
             <p:ph idx="1"/>
           </p:nvPr>
-        </p:nvSpPr>
-        <p:spPr/>
-        <p:txBody>
-          <a:bodyPr/>
-          <a:lstStyle/>
-          <a:p>
-            <a:r>
-              <a:rPr lang="de-DE" dirty="0"/>
-              <a:t>Formfaktor</a:t>
-            </a:r>
-          </a:p>
-          <a:p>
-            <a:r>
-              <a:rPr lang="de-DE" dirty="0"/>
-              <a:t>Zusammenführung der Komponenten</a:t>
-            </a:r>
-          </a:p>
-          <a:p>
-            <a:r>
-              <a:rPr lang="de-DE" dirty="0"/>
-              <a:t>Ladebuchse einbauen</a:t>
-            </a:r>
-          </a:p>
-          <a:p>
-            <a:pPr marL="457200" lvl="1" indent="0">
-              <a:buNone/>
-            </a:pPr>
-            <a:endParaRPr lang="de-DE" dirty="0"/>
-          </a:p>
-          <a:p>
-            <a:pPr marL="457200" lvl="1" indent="0">
-              <a:buNone/>
-            </a:pPr>
-            <a:endParaRPr lang="de-DE" dirty="0"/>
-          </a:p>
-        </p:txBody>
-      </p:sp>
+        </p:nvPicPr>
+        <p:blipFill>
+          <a:blip r:embed="rId3">
+            <a:extLst>
+              <a:ext uri="{28A0092B-C50C-407E-A947-70E740481C1C}">
+                <a14:useLocalDpi xmlns:a14="http://schemas.microsoft.com/office/drawing/2010/main" val="0"/>
+              </a:ext>
+            </a:extLst>
+          </a:blip>
+          <a:stretch>
+            <a:fillRect/>
+          </a:stretch>
+        </p:blipFill>
+        <p:spPr>
+          <a:xfrm>
+            <a:off x="2269823" y="1825625"/>
+            <a:ext cx="7652353" cy="4351338"/>
+          </a:xfrm>
+        </p:spPr>
+      </p:pic>
+      <p:cxnSp>
+        <p:nvCxnSpPr>
+          <p:cNvPr id="11" name="Straight Connector 10">
+            <a:extLst>
+              <a:ext uri="{FF2B5EF4-FFF2-40B4-BE49-F238E27FC236}">
+                <a16:creationId xmlns:a16="http://schemas.microsoft.com/office/drawing/2014/main" id="{BC2F9ABC-DF28-4E86-99D6-F465D4A72030}"/>
+              </a:ext>
+            </a:extLst>
+          </p:cNvPr>
+          <p:cNvCxnSpPr/>
+          <p:nvPr/>
+        </p:nvCxnSpPr>
+        <p:spPr>
+          <a:xfrm flipV="1">
+            <a:off x="5430416" y="3498980"/>
+            <a:ext cx="3116425" cy="121298"/>
+          </a:xfrm>
+          <a:prstGeom prst="line">
+            <a:avLst/>
+          </a:prstGeom>
+          <a:ln>
+            <a:solidFill>
+              <a:srgbClr val="FF0000"/>
+            </a:solidFill>
+          </a:ln>
+        </p:spPr>
+        <p:style>
+          <a:lnRef idx="1">
+            <a:schemeClr val="accent1"/>
+          </a:lnRef>
+          <a:fillRef idx="0">
+            <a:schemeClr val="accent1"/>
+          </a:fillRef>
+          <a:effectRef idx="0">
+            <a:schemeClr val="accent1"/>
+          </a:effectRef>
+          <a:fontRef idx="minor">
+            <a:schemeClr val="tx1"/>
+          </a:fontRef>
+        </p:style>
+      </p:cxnSp>
+      <p:cxnSp>
+        <p:nvCxnSpPr>
+          <p:cNvPr id="13" name="Straight Connector 12">
+            <a:extLst>
+              <a:ext uri="{FF2B5EF4-FFF2-40B4-BE49-F238E27FC236}">
+                <a16:creationId xmlns:a16="http://schemas.microsoft.com/office/drawing/2014/main" id="{52BFA6F3-BE00-4722-A8E8-CF2A2B3ED03A}"/>
+              </a:ext>
+            </a:extLst>
+          </p:cNvPr>
+          <p:cNvCxnSpPr/>
+          <p:nvPr/>
+        </p:nvCxnSpPr>
+        <p:spPr>
+          <a:xfrm>
+            <a:off x="5431631" y="3624263"/>
+            <a:ext cx="221457" cy="576262"/>
+          </a:xfrm>
+          <a:prstGeom prst="line">
+            <a:avLst/>
+          </a:prstGeom>
+          <a:ln>
+            <a:solidFill>
+              <a:srgbClr val="FF0000"/>
+            </a:solidFill>
+          </a:ln>
+        </p:spPr>
+        <p:style>
+          <a:lnRef idx="1">
+            <a:schemeClr val="accent1"/>
+          </a:lnRef>
+          <a:fillRef idx="0">
+            <a:schemeClr val="accent1"/>
+          </a:fillRef>
+          <a:effectRef idx="0">
+            <a:schemeClr val="accent1"/>
+          </a:effectRef>
+          <a:fontRef idx="minor">
+            <a:schemeClr val="tx1"/>
+          </a:fontRef>
+        </p:style>
+      </p:cxnSp>
+      <p:cxnSp>
+        <p:nvCxnSpPr>
+          <p:cNvPr id="15" name="Straight Connector 14">
+            <a:extLst>
+              <a:ext uri="{FF2B5EF4-FFF2-40B4-BE49-F238E27FC236}">
+                <a16:creationId xmlns:a16="http://schemas.microsoft.com/office/drawing/2014/main" id="{240CEFA9-107E-480C-99A1-29FBACE9B517}"/>
+              </a:ext>
+            </a:extLst>
+          </p:cNvPr>
+          <p:cNvCxnSpPr/>
+          <p:nvPr/>
+        </p:nvCxnSpPr>
+        <p:spPr>
+          <a:xfrm flipV="1">
+            <a:off x="5653088" y="3964781"/>
+            <a:ext cx="4017168" cy="235744"/>
+          </a:xfrm>
+          <a:prstGeom prst="line">
+            <a:avLst/>
+          </a:prstGeom>
+          <a:ln>
+            <a:solidFill>
+              <a:srgbClr val="FF0000"/>
+            </a:solidFill>
+          </a:ln>
+        </p:spPr>
+        <p:style>
+          <a:lnRef idx="1">
+            <a:schemeClr val="accent1"/>
+          </a:lnRef>
+          <a:fillRef idx="0">
+            <a:schemeClr val="accent1"/>
+          </a:fillRef>
+          <a:effectRef idx="0">
+            <a:schemeClr val="accent1"/>
+          </a:effectRef>
+          <a:fontRef idx="minor">
+            <a:schemeClr val="tx1"/>
+          </a:fontRef>
+        </p:style>
+      </p:cxnSp>
+      <p:cxnSp>
+        <p:nvCxnSpPr>
+          <p:cNvPr id="17" name="Straight Connector 16">
+            <a:extLst>
+              <a:ext uri="{FF2B5EF4-FFF2-40B4-BE49-F238E27FC236}">
+                <a16:creationId xmlns:a16="http://schemas.microsoft.com/office/drawing/2014/main" id="{BD39D293-C950-446E-8F01-7C57D57DDAA7}"/>
+              </a:ext>
+            </a:extLst>
+          </p:cNvPr>
+          <p:cNvCxnSpPr/>
+          <p:nvPr/>
+        </p:nvCxnSpPr>
+        <p:spPr>
+          <a:xfrm flipH="1" flipV="1">
+            <a:off x="8546841" y="3498980"/>
+            <a:ext cx="1135322" cy="468183"/>
+          </a:xfrm>
+          <a:prstGeom prst="line">
+            <a:avLst/>
+          </a:prstGeom>
+          <a:ln>
+            <a:solidFill>
+              <a:srgbClr val="FF0000"/>
+            </a:solidFill>
+          </a:ln>
+        </p:spPr>
+        <p:style>
+          <a:lnRef idx="1">
+            <a:schemeClr val="accent1"/>
+          </a:lnRef>
+          <a:fillRef idx="0">
+            <a:schemeClr val="accent1"/>
+          </a:fillRef>
+          <a:effectRef idx="0">
+            <a:schemeClr val="accent1"/>
+          </a:effectRef>
+          <a:fontRef idx="minor">
+            <a:schemeClr val="tx1"/>
+          </a:fontRef>
+        </p:style>
+      </p:cxnSp>
+      <p:cxnSp>
+        <p:nvCxnSpPr>
+          <p:cNvPr id="19" name="Straight Arrow Connector 18">
+            <a:extLst>
+              <a:ext uri="{FF2B5EF4-FFF2-40B4-BE49-F238E27FC236}">
+                <a16:creationId xmlns:a16="http://schemas.microsoft.com/office/drawing/2014/main" id="{F93EC683-12F0-4A07-9317-42AB264E5E89}"/>
+              </a:ext>
+            </a:extLst>
+          </p:cNvPr>
+          <p:cNvCxnSpPr/>
+          <p:nvPr/>
+        </p:nvCxnSpPr>
+        <p:spPr>
+          <a:xfrm flipH="1">
+            <a:off x="5653088" y="2308194"/>
+            <a:ext cx="1058430" cy="1604200"/>
+          </a:xfrm>
+          <a:prstGeom prst="straightConnector1">
+            <a:avLst/>
+          </a:prstGeom>
+          <a:ln>
+            <a:solidFill>
+              <a:srgbClr val="FF0000"/>
+            </a:solidFill>
+            <a:tailEnd type="triangle"/>
+          </a:ln>
+        </p:spPr>
+        <p:style>
+          <a:lnRef idx="1">
+            <a:schemeClr val="accent1"/>
+          </a:lnRef>
+          <a:fillRef idx="0">
+            <a:schemeClr val="accent1"/>
+          </a:fillRef>
+          <a:effectRef idx="0">
+            <a:schemeClr val="accent1"/>
+          </a:effectRef>
+          <a:fontRef idx="minor">
+            <a:schemeClr val="tx1"/>
+          </a:fontRef>
+        </p:style>
+      </p:cxnSp>
+      <p:cxnSp>
+        <p:nvCxnSpPr>
+          <p:cNvPr id="21" name="Straight Connector 20">
+            <a:extLst>
+              <a:ext uri="{FF2B5EF4-FFF2-40B4-BE49-F238E27FC236}">
+                <a16:creationId xmlns:a16="http://schemas.microsoft.com/office/drawing/2014/main" id="{D9A9AD02-4187-4038-82C0-44B4850E0DA8}"/>
+              </a:ext>
+            </a:extLst>
+          </p:cNvPr>
+          <p:cNvCxnSpPr>
+            <a:cxnSpLocks/>
+          </p:cNvCxnSpPr>
+          <p:nvPr/>
+        </p:nvCxnSpPr>
+        <p:spPr>
+          <a:xfrm>
+            <a:off x="3405188" y="4948238"/>
+            <a:ext cx="172513" cy="147545"/>
+          </a:xfrm>
+          <a:prstGeom prst="line">
+            <a:avLst/>
+          </a:prstGeom>
+          <a:ln>
+            <a:solidFill>
+              <a:srgbClr val="FF0000"/>
+            </a:solidFill>
+          </a:ln>
+        </p:spPr>
+        <p:style>
+          <a:lnRef idx="1">
+            <a:schemeClr val="accent1"/>
+          </a:lnRef>
+          <a:fillRef idx="0">
+            <a:schemeClr val="accent1"/>
+          </a:fillRef>
+          <a:effectRef idx="0">
+            <a:schemeClr val="accent1"/>
+          </a:effectRef>
+          <a:fontRef idx="minor">
+            <a:schemeClr val="tx1"/>
+          </a:fontRef>
+        </p:style>
+      </p:cxnSp>
+      <p:cxnSp>
+        <p:nvCxnSpPr>
+          <p:cNvPr id="23" name="Straight Connector 22">
+            <a:extLst>
+              <a:ext uri="{FF2B5EF4-FFF2-40B4-BE49-F238E27FC236}">
+                <a16:creationId xmlns:a16="http://schemas.microsoft.com/office/drawing/2014/main" id="{E1075205-A165-4FFC-BE12-4D80432AC489}"/>
+              </a:ext>
+            </a:extLst>
+          </p:cNvPr>
+          <p:cNvCxnSpPr>
+            <a:cxnSpLocks/>
+          </p:cNvCxnSpPr>
+          <p:nvPr/>
+        </p:nvCxnSpPr>
+        <p:spPr>
+          <a:xfrm flipV="1">
+            <a:off x="3405188" y="4948238"/>
+            <a:ext cx="125412" cy="147545"/>
+          </a:xfrm>
+          <a:prstGeom prst="line">
+            <a:avLst/>
+          </a:prstGeom>
+          <a:ln>
+            <a:solidFill>
+              <a:srgbClr val="FF0000"/>
+            </a:solidFill>
+          </a:ln>
+        </p:spPr>
+        <p:style>
+          <a:lnRef idx="1">
+            <a:schemeClr val="accent1"/>
+          </a:lnRef>
+          <a:fillRef idx="0">
+            <a:schemeClr val="accent1"/>
+          </a:fillRef>
+          <a:effectRef idx="0">
+            <a:schemeClr val="accent1"/>
+          </a:effectRef>
+          <a:fontRef idx="minor">
+            <a:schemeClr val="tx1"/>
+          </a:fontRef>
+        </p:style>
+      </p:cxnSp>
     </p:spTree>
     <p:extLst>
       <p:ext uri="{BB962C8B-B14F-4D97-AF65-F5344CB8AC3E}">
-        <p14:creationId xmlns:p14="http://schemas.microsoft.com/office/powerpoint/2010/main" val="2909387947"/>
+        <p14:creationId xmlns:p14="http://schemas.microsoft.com/office/powerpoint/2010/main" val="454774763"/>
       </p:ext>
     </p:extLst>
   </p:cSld>
   <p:clrMapOvr>
     <a:masterClrMapping/>
   </p:clrMapOvr>
+  <p:timing>
+    <p:tnLst>
+      <p:par>
+        <p:cTn id="1" dur="indefinite" restart="never" nodeType="tmRoot">
+          <p:childTnLst>
+            <p:seq concurrent="1" nextAc="seek">
+              <p:cTn id="2" dur="indefinite" nodeType="mainSeq">
+                <p:childTnLst>
+                  <p:par>
+                    <p:cTn id="3" fill="hold">
+                      <p:stCondLst>
+                        <p:cond delay="indefinite"/>
+                      </p:stCondLst>
+                      <p:childTnLst>
+                        <p:par>
+                          <p:cTn id="4" fill="hold">
+                            <p:stCondLst>
+                              <p:cond delay="0"/>
+                            </p:stCondLst>
+                            <p:childTnLst>
+                              <p:par>
+                                <p:cTn id="5" presetID="1" presetClass="entr" presetSubtype="0" fill="hold" nodeType="clickEffect">
+                                  <p:stCondLst>
+                                    <p:cond delay="0"/>
+                                  </p:stCondLst>
+                                  <p:childTnLst>
+                                    <p:set>
+                                      <p:cBhvr>
+                                        <p:cTn id="6" dur="1" fill="hold">
+                                          <p:stCondLst>
+                                            <p:cond delay="0"/>
+                                          </p:stCondLst>
+                                        </p:cTn>
+                                        <p:tgtEl>
+                                          <p:spTgt spid="11"/>
+                                        </p:tgtEl>
+                                        <p:attrNameLst>
+                                          <p:attrName>style.visibility</p:attrName>
+                                        </p:attrNameLst>
+                                      </p:cBhvr>
+                                      <p:to>
+                                        <p:strVal val="visible"/>
+                                      </p:to>
+                                    </p:set>
+                                  </p:childTnLst>
+                                </p:cTn>
+                              </p:par>
+                              <p:par>
+                                <p:cTn id="7" presetID="1" presetClass="entr" presetSubtype="0" fill="hold" nodeType="withEffect">
+                                  <p:stCondLst>
+                                    <p:cond delay="0"/>
+                                  </p:stCondLst>
+                                  <p:childTnLst>
+                                    <p:set>
+                                      <p:cBhvr>
+                                        <p:cTn id="8" dur="1" fill="hold">
+                                          <p:stCondLst>
+                                            <p:cond delay="0"/>
+                                          </p:stCondLst>
+                                        </p:cTn>
+                                        <p:tgtEl>
+                                          <p:spTgt spid="13"/>
+                                        </p:tgtEl>
+                                        <p:attrNameLst>
+                                          <p:attrName>style.visibility</p:attrName>
+                                        </p:attrNameLst>
+                                      </p:cBhvr>
+                                      <p:to>
+                                        <p:strVal val="visible"/>
+                                      </p:to>
+                                    </p:set>
+                                  </p:childTnLst>
+                                </p:cTn>
+                              </p:par>
+                              <p:par>
+                                <p:cTn id="9" presetID="1" presetClass="entr" presetSubtype="0" fill="hold" nodeType="withEffect">
+                                  <p:stCondLst>
+                                    <p:cond delay="0"/>
+                                  </p:stCondLst>
+                                  <p:childTnLst>
+                                    <p:set>
+                                      <p:cBhvr>
+                                        <p:cTn id="10" dur="1" fill="hold">
+                                          <p:stCondLst>
+                                            <p:cond delay="0"/>
+                                          </p:stCondLst>
+                                        </p:cTn>
+                                        <p:tgtEl>
+                                          <p:spTgt spid="15"/>
+                                        </p:tgtEl>
+                                        <p:attrNameLst>
+                                          <p:attrName>style.visibility</p:attrName>
+                                        </p:attrNameLst>
+                                      </p:cBhvr>
+                                      <p:to>
+                                        <p:strVal val="visible"/>
+                                      </p:to>
+                                    </p:set>
+                                  </p:childTnLst>
+                                </p:cTn>
+                              </p:par>
+                              <p:par>
+                                <p:cTn id="11" presetID="1" presetClass="entr" presetSubtype="0" fill="hold" nodeType="withEffect">
+                                  <p:stCondLst>
+                                    <p:cond delay="0"/>
+                                  </p:stCondLst>
+                                  <p:childTnLst>
+                                    <p:set>
+                                      <p:cBhvr>
+                                        <p:cTn id="12" dur="1" fill="hold">
+                                          <p:stCondLst>
+                                            <p:cond delay="0"/>
+                                          </p:stCondLst>
+                                        </p:cTn>
+                                        <p:tgtEl>
+                                          <p:spTgt spid="17"/>
+                                        </p:tgtEl>
+                                        <p:attrNameLst>
+                                          <p:attrName>style.visibility</p:attrName>
+                                        </p:attrNameLst>
+                                      </p:cBhvr>
+                                      <p:to>
+                                        <p:strVal val="visible"/>
+                                      </p:to>
+                                    </p:set>
+                                  </p:childTnLst>
+                                </p:cTn>
+                              </p:par>
+                            </p:childTnLst>
+                          </p:cTn>
+                        </p:par>
+                      </p:childTnLst>
+                    </p:cTn>
+                  </p:par>
+                  <p:par>
+                    <p:cTn id="13" fill="hold">
+                      <p:stCondLst>
+                        <p:cond delay="indefinite"/>
+                      </p:stCondLst>
+                      <p:childTnLst>
+                        <p:par>
+                          <p:cTn id="14" fill="hold">
+                            <p:stCondLst>
+                              <p:cond delay="0"/>
+                            </p:stCondLst>
+                            <p:childTnLst>
+                              <p:par>
+                                <p:cTn id="15" presetID="1" presetClass="exit" presetSubtype="0" fill="hold" nodeType="clickEffect">
+                                  <p:stCondLst>
+                                    <p:cond delay="0"/>
+                                  </p:stCondLst>
+                                  <p:childTnLst>
+                                    <p:set>
+                                      <p:cBhvr>
+                                        <p:cTn id="16" dur="1" fill="hold">
+                                          <p:stCondLst>
+                                            <p:cond delay="0"/>
+                                          </p:stCondLst>
+                                        </p:cTn>
+                                        <p:tgtEl>
+                                          <p:spTgt spid="11"/>
+                                        </p:tgtEl>
+                                        <p:attrNameLst>
+                                          <p:attrName>style.visibility</p:attrName>
+                                        </p:attrNameLst>
+                                      </p:cBhvr>
+                                      <p:to>
+                                        <p:strVal val="hidden"/>
+                                      </p:to>
+                                    </p:set>
+                                  </p:childTnLst>
+                                </p:cTn>
+                              </p:par>
+                              <p:par>
+                                <p:cTn id="17" presetID="1" presetClass="exit" presetSubtype="0" fill="hold" nodeType="withEffect">
+                                  <p:stCondLst>
+                                    <p:cond delay="0"/>
+                                  </p:stCondLst>
+                                  <p:childTnLst>
+                                    <p:set>
+                                      <p:cBhvr>
+                                        <p:cTn id="18" dur="1" fill="hold">
+                                          <p:stCondLst>
+                                            <p:cond delay="0"/>
+                                          </p:stCondLst>
+                                        </p:cTn>
+                                        <p:tgtEl>
+                                          <p:spTgt spid="13"/>
+                                        </p:tgtEl>
+                                        <p:attrNameLst>
+                                          <p:attrName>style.visibility</p:attrName>
+                                        </p:attrNameLst>
+                                      </p:cBhvr>
+                                      <p:to>
+                                        <p:strVal val="hidden"/>
+                                      </p:to>
+                                    </p:set>
+                                  </p:childTnLst>
+                                </p:cTn>
+                              </p:par>
+                              <p:par>
+                                <p:cTn id="19" presetID="1" presetClass="exit" presetSubtype="0" fill="hold" nodeType="withEffect">
+                                  <p:stCondLst>
+                                    <p:cond delay="0"/>
+                                  </p:stCondLst>
+                                  <p:childTnLst>
+                                    <p:set>
+                                      <p:cBhvr>
+                                        <p:cTn id="20" dur="1" fill="hold">
+                                          <p:stCondLst>
+                                            <p:cond delay="0"/>
+                                          </p:stCondLst>
+                                        </p:cTn>
+                                        <p:tgtEl>
+                                          <p:spTgt spid="15"/>
+                                        </p:tgtEl>
+                                        <p:attrNameLst>
+                                          <p:attrName>style.visibility</p:attrName>
+                                        </p:attrNameLst>
+                                      </p:cBhvr>
+                                      <p:to>
+                                        <p:strVal val="hidden"/>
+                                      </p:to>
+                                    </p:set>
+                                  </p:childTnLst>
+                                </p:cTn>
+                              </p:par>
+                              <p:par>
+                                <p:cTn id="21" presetID="1" presetClass="exit" presetSubtype="0" fill="hold" nodeType="withEffect">
+                                  <p:stCondLst>
+                                    <p:cond delay="0"/>
+                                  </p:stCondLst>
+                                  <p:childTnLst>
+                                    <p:set>
+                                      <p:cBhvr>
+                                        <p:cTn id="22" dur="1" fill="hold">
+                                          <p:stCondLst>
+                                            <p:cond delay="0"/>
+                                          </p:stCondLst>
+                                        </p:cTn>
+                                        <p:tgtEl>
+                                          <p:spTgt spid="17"/>
+                                        </p:tgtEl>
+                                        <p:attrNameLst>
+                                          <p:attrName>style.visibility</p:attrName>
+                                        </p:attrNameLst>
+                                      </p:cBhvr>
+                                      <p:to>
+                                        <p:strVal val="hidden"/>
+                                      </p:to>
+                                    </p:set>
+                                  </p:childTnLst>
+                                </p:cTn>
+                              </p:par>
+                              <p:par>
+                                <p:cTn id="23" presetID="1" presetClass="entr" presetSubtype="0" fill="hold" nodeType="withEffect">
+                                  <p:stCondLst>
+                                    <p:cond delay="0"/>
+                                  </p:stCondLst>
+                                  <p:childTnLst>
+                                    <p:set>
+                                      <p:cBhvr>
+                                        <p:cTn id="24" dur="1" fill="hold">
+                                          <p:stCondLst>
+                                            <p:cond delay="0"/>
+                                          </p:stCondLst>
+                                        </p:cTn>
+                                        <p:tgtEl>
+                                          <p:spTgt spid="19"/>
+                                        </p:tgtEl>
+                                        <p:attrNameLst>
+                                          <p:attrName>style.visibility</p:attrName>
+                                        </p:attrNameLst>
+                                      </p:cBhvr>
+                                      <p:to>
+                                        <p:strVal val="visible"/>
+                                      </p:to>
+                                    </p:set>
+                                  </p:childTnLst>
+                                </p:cTn>
+                              </p:par>
+                              <p:par>
+                                <p:cTn id="25" presetID="1" presetClass="entr" presetSubtype="0" fill="hold" nodeType="withEffect">
+                                  <p:stCondLst>
+                                    <p:cond delay="0"/>
+                                  </p:stCondLst>
+                                  <p:childTnLst>
+                                    <p:set>
+                                      <p:cBhvr>
+                                        <p:cTn id="26" dur="1" fill="hold">
+                                          <p:stCondLst>
+                                            <p:cond delay="0"/>
+                                          </p:stCondLst>
+                                        </p:cTn>
+                                        <p:tgtEl>
+                                          <p:spTgt spid="23"/>
+                                        </p:tgtEl>
+                                        <p:attrNameLst>
+                                          <p:attrName>style.visibility</p:attrName>
+                                        </p:attrNameLst>
+                                      </p:cBhvr>
+                                      <p:to>
+                                        <p:strVal val="visible"/>
+                                      </p:to>
+                                    </p:set>
+                                  </p:childTnLst>
+                                </p:cTn>
+                              </p:par>
+                              <p:par>
+                                <p:cTn id="27" presetID="1" presetClass="entr" presetSubtype="0" fill="hold" nodeType="withEffect">
+                                  <p:stCondLst>
+                                    <p:cond delay="0"/>
+                                  </p:stCondLst>
+                                  <p:childTnLst>
+                                    <p:set>
+                                      <p:cBhvr>
+                                        <p:cTn id="28" dur="1" fill="hold">
+                                          <p:stCondLst>
+                                            <p:cond delay="0"/>
+                                          </p:stCondLst>
+                                        </p:cTn>
+                                        <p:tgtEl>
+                                          <p:spTgt spid="21"/>
+                                        </p:tgtEl>
+                                        <p:attrNameLst>
+                                          <p:attrName>style.visibility</p:attrName>
+                                        </p:attrNameLst>
+                                      </p:cBhvr>
+                                      <p:to>
+                                        <p:strVal val="visible"/>
+                                      </p:to>
+                                    </p:set>
+                                  </p:childTnLst>
+                                </p:cTn>
+                              </p:par>
+                            </p:childTnLst>
+                          </p:cTn>
+                        </p:par>
+                      </p:childTnLst>
+                    </p:cTn>
+                  </p:par>
+                </p:childTnLst>
+              </p:cTn>
+              <p:prevCondLst>
+                <p:cond evt="onPrev" delay="0">
+                  <p:tgtEl>
+                    <p:sldTgt/>
+                  </p:tgtEl>
+                </p:cond>
+              </p:prevCondLst>
+              <p:nextCondLst>
+                <p:cond evt="onNext" delay="0">
+                  <p:tgtEl>
+                    <p:sldTgt/>
+                  </p:tgtEl>
+                </p:cond>
+              </p:nextCondLst>
+            </p:seq>
+          </p:childTnLst>
+        </p:cTn>
+      </p:par>
+    </p:tnLst>
+  </p:timing>
 </p:sld>
 </file>
 
@@ -5338,76 +6801,312 @@
           <a:p>
             <a:r>
               <a:rPr lang="de-DE" dirty="0"/>
-              <a:t>Baum - Stand</a:t>
-            </a:r>
-          </a:p>
-        </p:txBody>
-      </p:sp>
-      <p:sp>
-        <p:nvSpPr>
-          <p:cNvPr id="3" name="Inhaltsplatzhalter 2">
-            <a:extLst>
-              <a:ext uri="{FF2B5EF4-FFF2-40B4-BE49-F238E27FC236}">
-                <a16:creationId xmlns:a16="http://schemas.microsoft.com/office/drawing/2014/main" id="{0C400920-B351-4D1F-BA2C-AEBB87CD9379}"/>
-              </a:ext>
-            </a:extLst>
-          </p:cNvPr>
-          <p:cNvSpPr>
-            <a:spLocks noGrp="1"/>
-          </p:cNvSpPr>
+              <a:t>Fahrzeuge - Stand</a:t>
+            </a:r>
+          </a:p>
+        </p:txBody>
+      </p:sp>
+      <p:pic>
+        <p:nvPicPr>
+          <p:cNvPr id="9" name="Content Placeholder 8">
+            <a:extLst>
+              <a:ext uri="{FF2B5EF4-FFF2-40B4-BE49-F238E27FC236}">
+                <a16:creationId xmlns:a16="http://schemas.microsoft.com/office/drawing/2014/main" id="{A80886A5-89CE-4826-B4D3-D746BD99F747}"/>
+              </a:ext>
+            </a:extLst>
+          </p:cNvPr>
+          <p:cNvPicPr>
+            <a:picLocks noGrp="1" noChangeAspect="1"/>
+          </p:cNvPicPr>
           <p:nvPr>
             <p:ph idx="1"/>
           </p:nvPr>
-        </p:nvSpPr>
-        <p:spPr/>
-        <p:txBody>
-          <a:bodyPr/>
-          <a:lstStyle/>
-          <a:p>
-            <a:r>
-              <a:rPr lang="de-DE" dirty="0"/>
-              <a:t>Neue Form der Darstellung</a:t>
-            </a:r>
-          </a:p>
-          <a:p>
-            <a:r>
-              <a:rPr lang="de-DE" dirty="0"/>
-              <a:t>Alternative zu Display und Chart.js</a:t>
-            </a:r>
-          </a:p>
-          <a:p>
-            <a:endParaRPr lang="de-DE" dirty="0"/>
-          </a:p>
-          <a:p>
-            <a:r>
-              <a:rPr lang="de-DE" dirty="0"/>
-              <a:t>-&gt; BILD</a:t>
-            </a:r>
-          </a:p>
-          <a:p>
-            <a:pPr marL="457200" lvl="1" indent="0">
-              <a:buNone/>
-            </a:pPr>
-            <a:endParaRPr lang="de-DE" dirty="0"/>
-          </a:p>
-          <a:p>
-            <a:pPr marL="457200" lvl="1" indent="0">
-              <a:buNone/>
-            </a:pPr>
-            <a:endParaRPr lang="de-DE" dirty="0"/>
+        </p:nvPicPr>
+        <p:blipFill>
+          <a:blip r:embed="rId3">
+            <a:extLst>
+              <a:ext uri="{28A0092B-C50C-407E-A947-70E740481C1C}">
+                <a14:useLocalDpi xmlns:a14="http://schemas.microsoft.com/office/drawing/2010/main" val="0"/>
+              </a:ext>
+            </a:extLst>
+          </a:blip>
+          <a:stretch>
+            <a:fillRect/>
+          </a:stretch>
+        </p:blipFill>
+        <p:spPr>
+          <a:xfrm>
+            <a:off x="2269823" y="1825625"/>
+            <a:ext cx="7652353" cy="4351338"/>
+          </a:xfrm>
+        </p:spPr>
+      </p:pic>
+      <p:sp>
+        <p:nvSpPr>
+          <p:cNvPr id="10" name="Oval 9">
+            <a:extLst>
+              <a:ext uri="{FF2B5EF4-FFF2-40B4-BE49-F238E27FC236}">
+                <a16:creationId xmlns:a16="http://schemas.microsoft.com/office/drawing/2014/main" id="{124D9A38-7DFD-438F-AF46-548E4720204D}"/>
+              </a:ext>
+            </a:extLst>
+          </p:cNvPr>
+          <p:cNvSpPr/>
+          <p:nvPr/>
+        </p:nvSpPr>
+        <p:spPr>
+          <a:xfrm>
+            <a:off x="5131837" y="2761861"/>
+            <a:ext cx="1586204" cy="1483568"/>
+          </a:xfrm>
+          <a:prstGeom prst="ellipse">
+            <a:avLst/>
+          </a:prstGeom>
+          <a:noFill/>
+          <a:ln w="28575">
+            <a:solidFill>
+              <a:srgbClr val="FF0000"/>
+            </a:solidFill>
+          </a:ln>
+        </p:spPr>
+        <p:style>
+          <a:lnRef idx="2">
+            <a:schemeClr val="accent1">
+              <a:shade val="50000"/>
+            </a:schemeClr>
+          </a:lnRef>
+          <a:fillRef idx="1">
+            <a:schemeClr val="accent1"/>
+          </a:fillRef>
+          <a:effectRef idx="0">
+            <a:schemeClr val="accent1"/>
+          </a:effectRef>
+          <a:fontRef idx="minor">
+            <a:schemeClr val="lt1"/>
+          </a:fontRef>
+        </p:style>
+        <p:txBody>
+          <a:bodyPr rtlCol="0" anchor="ctr"/>
+          <a:lstStyle/>
+          <a:p>
+            <a:pPr algn="ctr"/>
+            <a:endParaRPr lang="en-DE"/>
+          </a:p>
+        </p:txBody>
+      </p:sp>
+      <p:sp>
+        <p:nvSpPr>
+          <p:cNvPr id="11" name="Oval 10">
+            <a:extLst>
+              <a:ext uri="{FF2B5EF4-FFF2-40B4-BE49-F238E27FC236}">
+                <a16:creationId xmlns:a16="http://schemas.microsoft.com/office/drawing/2014/main" id="{7D4CFE15-E48F-45CD-97E9-2A7828F9330F}"/>
+              </a:ext>
+            </a:extLst>
+          </p:cNvPr>
+          <p:cNvSpPr/>
+          <p:nvPr/>
+        </p:nvSpPr>
+        <p:spPr>
+          <a:xfrm>
+            <a:off x="5877561" y="4778089"/>
+            <a:ext cx="319052" cy="317693"/>
+          </a:xfrm>
+          <a:prstGeom prst="ellipse">
+            <a:avLst/>
+          </a:prstGeom>
+          <a:noFill/>
+          <a:ln w="28575">
+            <a:solidFill>
+              <a:srgbClr val="FF0000"/>
+            </a:solidFill>
+          </a:ln>
+        </p:spPr>
+        <p:style>
+          <a:lnRef idx="2">
+            <a:schemeClr val="accent1">
+              <a:shade val="50000"/>
+            </a:schemeClr>
+          </a:lnRef>
+          <a:fillRef idx="1">
+            <a:schemeClr val="accent1"/>
+          </a:fillRef>
+          <a:effectRef idx="0">
+            <a:schemeClr val="accent1"/>
+          </a:effectRef>
+          <a:fontRef idx="minor">
+            <a:schemeClr val="lt1"/>
+          </a:fontRef>
+        </p:style>
+        <p:txBody>
+          <a:bodyPr rtlCol="0" anchor="ctr"/>
+          <a:lstStyle/>
+          <a:p>
+            <a:pPr algn="ctr"/>
+            <a:endParaRPr lang="en-DE"/>
           </a:p>
         </p:txBody>
       </p:sp>
     </p:spTree>
     <p:extLst>
       <p:ext uri="{BB962C8B-B14F-4D97-AF65-F5344CB8AC3E}">
-        <p14:creationId xmlns:p14="http://schemas.microsoft.com/office/powerpoint/2010/main" val="1444141870"/>
+        <p14:creationId xmlns:p14="http://schemas.microsoft.com/office/powerpoint/2010/main" val="2473639487"/>
       </p:ext>
     </p:extLst>
   </p:cSld>
   <p:clrMapOvr>
     <a:masterClrMapping/>
   </p:clrMapOvr>
+  <p:timing>
+    <p:tnLst>
+      <p:par>
+        <p:cTn id="1" dur="indefinite" restart="never" nodeType="tmRoot">
+          <p:childTnLst>
+            <p:seq concurrent="1" nextAc="seek">
+              <p:cTn id="2" dur="indefinite" nodeType="mainSeq">
+                <p:childTnLst>
+                  <p:par>
+                    <p:cTn id="3" fill="hold">
+                      <p:stCondLst>
+                        <p:cond delay="indefinite"/>
+                      </p:stCondLst>
+                      <p:childTnLst>
+                        <p:par>
+                          <p:cTn id="4" fill="hold">
+                            <p:stCondLst>
+                              <p:cond delay="0"/>
+                            </p:stCondLst>
+                            <p:childTnLst>
+                              <p:par>
+                                <p:cTn id="5" presetID="1" presetClass="entr" presetSubtype="0" fill="hold" grpId="0" nodeType="clickEffect">
+                                  <p:stCondLst>
+                                    <p:cond delay="0"/>
+                                  </p:stCondLst>
+                                  <p:childTnLst>
+                                    <p:set>
+                                      <p:cBhvr>
+                                        <p:cTn id="6" dur="1" fill="hold">
+                                          <p:stCondLst>
+                                            <p:cond delay="0"/>
+                                          </p:stCondLst>
+                                        </p:cTn>
+                                        <p:tgtEl>
+                                          <p:spTgt spid="10"/>
+                                        </p:tgtEl>
+                                        <p:attrNameLst>
+                                          <p:attrName>style.visibility</p:attrName>
+                                        </p:attrNameLst>
+                                      </p:cBhvr>
+                                      <p:to>
+                                        <p:strVal val="visible"/>
+                                      </p:to>
+                                    </p:set>
+                                  </p:childTnLst>
+                                </p:cTn>
+                              </p:par>
+                            </p:childTnLst>
+                          </p:cTn>
+                        </p:par>
+                      </p:childTnLst>
+                    </p:cTn>
+                  </p:par>
+                  <p:par>
+                    <p:cTn id="7" fill="hold">
+                      <p:stCondLst>
+                        <p:cond delay="indefinite"/>
+                      </p:stCondLst>
+                      <p:childTnLst>
+                        <p:par>
+                          <p:cTn id="8" fill="hold">
+                            <p:stCondLst>
+                              <p:cond delay="0"/>
+                            </p:stCondLst>
+                            <p:childTnLst>
+                              <p:par>
+                                <p:cTn id="9" presetID="1" presetClass="exit" presetSubtype="0" fill="hold" grpId="1" nodeType="clickEffect">
+                                  <p:stCondLst>
+                                    <p:cond delay="0"/>
+                                  </p:stCondLst>
+                                  <p:childTnLst>
+                                    <p:set>
+                                      <p:cBhvr>
+                                        <p:cTn id="10" dur="1" fill="hold">
+                                          <p:stCondLst>
+                                            <p:cond delay="0"/>
+                                          </p:stCondLst>
+                                        </p:cTn>
+                                        <p:tgtEl>
+                                          <p:spTgt spid="10"/>
+                                        </p:tgtEl>
+                                        <p:attrNameLst>
+                                          <p:attrName>style.visibility</p:attrName>
+                                        </p:attrNameLst>
+                                      </p:cBhvr>
+                                      <p:to>
+                                        <p:strVal val="hidden"/>
+                                      </p:to>
+                                    </p:set>
+                                  </p:childTnLst>
+                                </p:cTn>
+                              </p:par>
+                              <p:par>
+                                <p:cTn id="11" presetID="1" presetClass="entr" presetSubtype="0" fill="hold" grpId="0" nodeType="withEffect">
+                                  <p:stCondLst>
+                                    <p:cond delay="0"/>
+                                  </p:stCondLst>
+                                  <p:childTnLst>
+                                    <p:set>
+                                      <p:cBhvr>
+                                        <p:cTn id="12" dur="1" fill="hold">
+                                          <p:stCondLst>
+                                            <p:cond delay="0"/>
+                                          </p:stCondLst>
+                                        </p:cTn>
+                                        <p:tgtEl>
+                                          <p:spTgt spid="11"/>
+                                        </p:tgtEl>
+                                        <p:attrNameLst>
+                                          <p:attrName>style.visibility</p:attrName>
+                                        </p:attrNameLst>
+                                      </p:cBhvr>
+                                      <p:to>
+                                        <p:strVal val="visible"/>
+                                      </p:to>
+                                    </p:set>
+                                  </p:childTnLst>
+                                </p:cTn>
+                              </p:par>
+                            </p:childTnLst>
+                          </p:cTn>
+                        </p:par>
+                      </p:childTnLst>
+                    </p:cTn>
+                  </p:par>
+                </p:childTnLst>
+              </p:cTn>
+              <p:prevCondLst>
+                <p:cond evt="onPrev" delay="0">
+                  <p:tgtEl>
+                    <p:sldTgt/>
+                  </p:tgtEl>
+                </p:cond>
+              </p:prevCondLst>
+              <p:nextCondLst>
+                <p:cond evt="onNext" delay="0">
+                  <p:tgtEl>
+                    <p:sldTgt/>
+                  </p:tgtEl>
+                </p:cond>
+              </p:nextCondLst>
+            </p:seq>
+          </p:childTnLst>
+        </p:cTn>
+      </p:par>
+    </p:tnLst>
+    <p:bldLst>
+      <p:bldP spid="10" grpId="0" animBg="1"/>
+      <p:bldP spid="10" grpId="1" animBg="1"/>
+      <p:bldP spid="11" grpId="0" animBg="1"/>
+    </p:bldLst>
+  </p:timing>
 </p:sld>
 </file>
 
@@ -5451,87 +7150,186 @@
           <a:p>
             <a:r>
               <a:rPr lang="de-DE" dirty="0"/>
-              <a:t>Baum - Herausforderungen</a:t>
-            </a:r>
-          </a:p>
-        </p:txBody>
-      </p:sp>
-      <p:sp>
-        <p:nvSpPr>
-          <p:cNvPr id="3" name="Inhaltsplatzhalter 2">
-            <a:extLst>
-              <a:ext uri="{FF2B5EF4-FFF2-40B4-BE49-F238E27FC236}">
-                <a16:creationId xmlns:a16="http://schemas.microsoft.com/office/drawing/2014/main" id="{0C400920-B351-4D1F-BA2C-AEBB87CD9379}"/>
-              </a:ext>
-            </a:extLst>
-          </p:cNvPr>
-          <p:cNvSpPr>
-            <a:spLocks noGrp="1"/>
-          </p:cNvSpPr>
+              <a:t>Fahrzeuge - Stand</a:t>
+            </a:r>
+          </a:p>
+        </p:txBody>
+      </p:sp>
+      <p:pic>
+        <p:nvPicPr>
+          <p:cNvPr id="6" name="Content Placeholder 5">
+            <a:extLst>
+              <a:ext uri="{FF2B5EF4-FFF2-40B4-BE49-F238E27FC236}">
+                <a16:creationId xmlns:a16="http://schemas.microsoft.com/office/drawing/2014/main" id="{7D241E51-BE71-483F-93F3-32CB5C624818}"/>
+              </a:ext>
+            </a:extLst>
+          </p:cNvPr>
+          <p:cNvPicPr>
+            <a:picLocks noGrp="1" noChangeAspect="1"/>
+          </p:cNvPicPr>
           <p:nvPr>
             <p:ph idx="1"/>
           </p:nvPr>
-        </p:nvSpPr>
-        <p:spPr/>
-        <p:txBody>
-          <a:bodyPr/>
-          <a:lstStyle/>
-          <a:p>
-            <a:r>
-              <a:rPr lang="de-DE" dirty="0"/>
-              <a:t>Umsetzung</a:t>
-            </a:r>
-          </a:p>
-          <a:p>
-            <a:pPr lvl="1"/>
-            <a:r>
-              <a:rPr lang="de-DE" dirty="0"/>
-              <a:t>Lasercutter</a:t>
-            </a:r>
-          </a:p>
-          <a:p>
-            <a:pPr lvl="1"/>
-            <a:r>
-              <a:rPr lang="de-DE" dirty="0"/>
-              <a:t>3D Druck</a:t>
-            </a:r>
-          </a:p>
-          <a:p>
-            <a:r>
-              <a:rPr lang="de-DE" dirty="0"/>
-              <a:t>Verbauen der Technik vs. Baum – „Look“</a:t>
-            </a:r>
-          </a:p>
-          <a:p>
-            <a:r>
-              <a:rPr lang="de-DE" dirty="0"/>
-              <a:t>Gehäuse und LED Integration</a:t>
-            </a:r>
-          </a:p>
-          <a:p>
-            <a:pPr marL="457200" lvl="1" indent="0">
-              <a:buNone/>
-            </a:pPr>
-            <a:endParaRPr lang="de-DE" dirty="0"/>
-          </a:p>
-          <a:p>
-            <a:pPr marL="457200" lvl="1" indent="0">
-              <a:buNone/>
-            </a:pPr>
-            <a:endParaRPr lang="de-DE" dirty="0"/>
+        </p:nvPicPr>
+        <p:blipFill>
+          <a:blip r:embed="rId3">
+            <a:extLst>
+              <a:ext uri="{28A0092B-C50C-407E-A947-70E740481C1C}">
+                <a14:useLocalDpi xmlns:a14="http://schemas.microsoft.com/office/drawing/2010/main" val="0"/>
+              </a:ext>
+            </a:extLst>
+          </a:blip>
+          <a:stretch>
+            <a:fillRect/>
+          </a:stretch>
+        </p:blipFill>
+        <p:spPr>
+          <a:xfrm>
+            <a:off x="2269823" y="1825625"/>
+            <a:ext cx="7652353" cy="4351338"/>
+          </a:xfrm>
+        </p:spPr>
+      </p:pic>
+      <p:sp>
+        <p:nvSpPr>
+          <p:cNvPr id="7" name="Oval 6">
+            <a:extLst>
+              <a:ext uri="{FF2B5EF4-FFF2-40B4-BE49-F238E27FC236}">
+                <a16:creationId xmlns:a16="http://schemas.microsoft.com/office/drawing/2014/main" id="{16BD0490-909A-472B-A273-1636BA9AC633}"/>
+              </a:ext>
+            </a:extLst>
+          </p:cNvPr>
+          <p:cNvSpPr/>
+          <p:nvPr/>
+        </p:nvSpPr>
+        <p:spPr>
+          <a:xfrm>
+            <a:off x="7009555" y="4498714"/>
+            <a:ext cx="550506" cy="597159"/>
+          </a:xfrm>
+          <a:prstGeom prst="ellipse">
+            <a:avLst/>
+          </a:prstGeom>
+          <a:noFill/>
+          <a:ln w="19050">
+            <a:solidFill>
+              <a:srgbClr val="FF0000"/>
+            </a:solidFill>
+          </a:ln>
+        </p:spPr>
+        <p:style>
+          <a:lnRef idx="2">
+            <a:schemeClr val="accent1">
+              <a:shade val="50000"/>
+            </a:schemeClr>
+          </a:lnRef>
+          <a:fillRef idx="1">
+            <a:schemeClr val="accent1"/>
+          </a:fillRef>
+          <a:effectRef idx="0">
+            <a:schemeClr val="accent1"/>
+          </a:effectRef>
+          <a:fontRef idx="minor">
+            <a:schemeClr val="lt1"/>
+          </a:fontRef>
+        </p:style>
+        <p:txBody>
+          <a:bodyPr rtlCol="0" anchor="ctr"/>
+          <a:lstStyle/>
+          <a:p>
+            <a:pPr algn="ctr"/>
+            <a:endParaRPr lang="en-DE"/>
           </a:p>
         </p:txBody>
       </p:sp>
     </p:spTree>
     <p:extLst>
       <p:ext uri="{BB962C8B-B14F-4D97-AF65-F5344CB8AC3E}">
-        <p14:creationId xmlns:p14="http://schemas.microsoft.com/office/powerpoint/2010/main" val="1670918476"/>
+        <p14:creationId xmlns:p14="http://schemas.microsoft.com/office/powerpoint/2010/main" val="4249180800"/>
       </p:ext>
     </p:extLst>
   </p:cSld>
   <p:clrMapOvr>
     <a:masterClrMapping/>
   </p:clrMapOvr>
+  <p:timing>
+    <p:tnLst>
+      <p:par>
+        <p:cTn id="1" dur="indefinite" restart="never" nodeType="tmRoot">
+          <p:childTnLst>
+            <p:seq concurrent="1" nextAc="seek">
+              <p:cTn id="2" dur="indefinite" nodeType="mainSeq">
+                <p:childTnLst>
+                  <p:par>
+                    <p:cTn id="3" fill="hold">
+                      <p:stCondLst>
+                        <p:cond delay="indefinite"/>
+                      </p:stCondLst>
+                      <p:childTnLst>
+                        <p:par>
+                          <p:cTn id="4" fill="hold">
+                            <p:stCondLst>
+                              <p:cond delay="0"/>
+                            </p:stCondLst>
+                            <p:childTnLst>
+                              <p:par>
+                                <p:cTn id="5" presetID="1" presetClass="entr" presetSubtype="0" fill="hold" grpId="0" nodeType="clickEffect">
+                                  <p:stCondLst>
+                                    <p:cond delay="0"/>
+                                  </p:stCondLst>
+                                  <p:childTnLst>
+                                    <p:set>
+                                      <p:cBhvr>
+                                        <p:cTn id="6" dur="1" fill="hold">
+                                          <p:stCondLst>
+                                            <p:cond delay="0"/>
+                                          </p:stCondLst>
+                                        </p:cTn>
+                                        <p:tgtEl>
+                                          <p:spTgt spid="7"/>
+                                        </p:tgtEl>
+                                        <p:attrNameLst>
+                                          <p:attrName>style.visibility</p:attrName>
+                                        </p:attrNameLst>
+                                      </p:cBhvr>
+                                      <p:to>
+                                        <p:strVal val="visible"/>
+                                      </p:to>
+                                    </p:set>
+                                  </p:childTnLst>
+                                </p:cTn>
+                              </p:par>
+                            </p:childTnLst>
+                          </p:cTn>
+                        </p:par>
+                      </p:childTnLst>
+                    </p:cTn>
+                  </p:par>
+                </p:childTnLst>
+              </p:cTn>
+              <p:prevCondLst>
+                <p:cond evt="onPrev" delay="0">
+                  <p:tgtEl>
+                    <p:sldTgt/>
+                  </p:tgtEl>
+                </p:cond>
+              </p:prevCondLst>
+              <p:nextCondLst>
+                <p:cond evt="onNext" delay="0">
+                  <p:tgtEl>
+                    <p:sldTgt/>
+                  </p:tgtEl>
+                </p:cond>
+              </p:nextCondLst>
+            </p:seq>
+          </p:childTnLst>
+        </p:cTn>
+      </p:par>
+    </p:tnLst>
+    <p:bldLst>
+      <p:bldP spid="7" grpId="0" animBg="1"/>
+    </p:bldLst>
+  </p:timing>
 </p:sld>
 </file>
 
@@ -5575,7 +7373,7 @@
           <a:p>
             <a:r>
               <a:rPr lang="de-DE" dirty="0"/>
-              <a:t>Schaltplan - Stand</a:t>
+              <a:t>Fahrzeuge - Herausforderungen</a:t>
             </a:r>
           </a:p>
         </p:txBody>
@@ -5600,6 +7398,24 @@
         <p:txBody>
           <a:bodyPr/>
           <a:lstStyle/>
+          <a:p>
+            <a:r>
+              <a:rPr lang="de-DE" dirty="0"/>
+              <a:t>Formfaktor</a:t>
+            </a:r>
+          </a:p>
+          <a:p>
+            <a:r>
+              <a:rPr lang="de-DE" dirty="0"/>
+              <a:t>Zusammenführung der Komponenten</a:t>
+            </a:r>
+          </a:p>
+          <a:p>
+            <a:r>
+              <a:rPr lang="de-DE" dirty="0"/>
+              <a:t>Ladebuchse einbauen</a:t>
+            </a:r>
+          </a:p>
           <a:p>
             <a:pPr marL="457200" lvl="1" indent="0">
               <a:buNone/>
@@ -5614,46 +7430,10 @@
           </a:p>
         </p:txBody>
       </p:sp>
-      <p:pic>
-        <p:nvPicPr>
-          <p:cNvPr id="5" name="Grafik 4" descr="Ein Bild, das Tisch, grün, Computer, Schild enthält.&#10;&#10;Automatisch generierte Beschreibung">
-            <a:extLst>
-              <a:ext uri="{FF2B5EF4-FFF2-40B4-BE49-F238E27FC236}">
-                <a16:creationId xmlns:a16="http://schemas.microsoft.com/office/drawing/2014/main" id="{989681F4-8743-4E3E-BFB8-4A9A8C85B1BA}"/>
-              </a:ext>
-            </a:extLst>
-          </p:cNvPr>
-          <p:cNvPicPr>
-            <a:picLocks noChangeAspect="1"/>
-          </p:cNvPicPr>
-          <p:nvPr/>
-        </p:nvPicPr>
-        <p:blipFill>
-          <a:blip r:embed="rId3">
-            <a:extLst>
-              <a:ext uri="{28A0092B-C50C-407E-A947-70E740481C1C}">
-                <a14:useLocalDpi xmlns:a14="http://schemas.microsoft.com/office/drawing/2010/main" val="0"/>
-              </a:ext>
-            </a:extLst>
-          </a:blip>
-          <a:stretch>
-            <a:fillRect/>
-          </a:stretch>
-        </p:blipFill>
-        <p:spPr>
-          <a:xfrm>
-            <a:off x="1571368" y="1342404"/>
-            <a:ext cx="9049264" cy="5515596"/>
-          </a:xfrm>
-          <a:prstGeom prst="rect">
-            <a:avLst/>
-          </a:prstGeom>
-        </p:spPr>
-      </p:pic>
     </p:spTree>
     <p:extLst>
       <p:ext uri="{BB962C8B-B14F-4D97-AF65-F5344CB8AC3E}">
-        <p14:creationId xmlns:p14="http://schemas.microsoft.com/office/powerpoint/2010/main" val="2006520549"/>
+        <p14:creationId xmlns:p14="http://schemas.microsoft.com/office/powerpoint/2010/main" val="2909387947"/>
       </p:ext>
     </p:extLst>
   </p:cSld>
@@ -5703,7 +7483,7 @@
           <a:p>
             <a:r>
               <a:rPr lang="de-DE" dirty="0"/>
-              <a:t>Schaltplan - Stand</a:t>
+              <a:t>Baum - Stand</a:t>
             </a:r>
           </a:p>
         </p:txBody>
@@ -5728,6 +7508,27 @@
         <p:txBody>
           <a:bodyPr/>
           <a:lstStyle/>
+          <a:p>
+            <a:r>
+              <a:rPr lang="de-DE" dirty="0"/>
+              <a:t>Neue Form der Darstellung</a:t>
+            </a:r>
+          </a:p>
+          <a:p>
+            <a:r>
+              <a:rPr lang="de-DE" dirty="0"/>
+              <a:t>Alternative zu Display und Chart.js</a:t>
+            </a:r>
+          </a:p>
+          <a:p>
+            <a:endParaRPr lang="de-DE" dirty="0"/>
+          </a:p>
+          <a:p>
+            <a:r>
+              <a:rPr lang="de-DE" dirty="0"/>
+              <a:t>-&gt; BILD</a:t>
+            </a:r>
+          </a:p>
           <a:p>
             <a:pPr marL="457200" lvl="1" indent="0">
               <a:buNone/>
@@ -5742,46 +7543,10 @@
           </a:p>
         </p:txBody>
       </p:sp>
-      <p:pic>
-        <p:nvPicPr>
-          <p:cNvPr id="6" name="Grafik 5" descr="Ein Bild, das Tisch, Parkplatz, weiß enthält.&#10;&#10;Automatisch generierte Beschreibung">
-            <a:extLst>
-              <a:ext uri="{FF2B5EF4-FFF2-40B4-BE49-F238E27FC236}">
-                <a16:creationId xmlns:a16="http://schemas.microsoft.com/office/drawing/2014/main" id="{3A88F726-91CC-44B8-A0ED-607601C10578}"/>
-              </a:ext>
-            </a:extLst>
-          </p:cNvPr>
-          <p:cNvPicPr>
-            <a:picLocks noChangeAspect="1"/>
-          </p:cNvPicPr>
-          <p:nvPr/>
-        </p:nvPicPr>
-        <p:blipFill>
-          <a:blip r:embed="rId3">
-            <a:extLst>
-              <a:ext uri="{28A0092B-C50C-407E-A947-70E740481C1C}">
-                <a14:useLocalDpi xmlns:a14="http://schemas.microsoft.com/office/drawing/2010/main" val="0"/>
-              </a:ext>
-            </a:extLst>
-          </a:blip>
-          <a:stretch>
-            <a:fillRect/>
-          </a:stretch>
-        </p:blipFill>
-        <p:spPr>
-          <a:xfrm>
-            <a:off x="3219563" y="1322641"/>
-            <a:ext cx="5752873" cy="5367408"/>
-          </a:xfrm>
-          <a:prstGeom prst="rect">
-            <a:avLst/>
-          </a:prstGeom>
-        </p:spPr>
-      </p:pic>
     </p:spTree>
     <p:extLst>
       <p:ext uri="{BB962C8B-B14F-4D97-AF65-F5344CB8AC3E}">
-        <p14:creationId xmlns:p14="http://schemas.microsoft.com/office/powerpoint/2010/main" val="1595897628"/>
+        <p14:creationId xmlns:p14="http://schemas.microsoft.com/office/powerpoint/2010/main" val="1444141870"/>
       </p:ext>
     </p:extLst>
   </p:cSld>
@@ -5831,7 +7596,7 @@
           <a:p>
             <a:r>
               <a:rPr lang="de-DE" dirty="0"/>
-              <a:t>Schaltplan – Herausforderungen</a:t>
+              <a:t>Baum - Herausforderungen</a:t>
             </a:r>
           </a:p>
         </p:txBody>
@@ -5859,47 +7624,34 @@
           <a:p>
             <a:r>
               <a:rPr lang="de-DE" dirty="0"/>
-              <a:t>Aktueller Microcontroller ungeeignet</a:t>
+              <a:t>Umsetzung</a:t>
             </a:r>
           </a:p>
           <a:p>
             <a:pPr lvl="1"/>
             <a:r>
               <a:rPr lang="de-DE" dirty="0"/>
-              <a:t>Max. 3.3V vs 5V</a:t>
+              <a:t>Lasercutter</a:t>
             </a:r>
           </a:p>
           <a:p>
             <a:pPr lvl="1"/>
             <a:r>
               <a:rPr lang="de-DE" dirty="0"/>
-              <a:t>Hall-Sensor benötigt mehr Volt</a:t>
-            </a:r>
-          </a:p>
-          <a:p>
-            <a:pPr lvl="1"/>
+              <a:t>3D Druck</a:t>
+            </a:r>
+          </a:p>
+          <a:p>
             <a:r>
               <a:rPr lang="de-DE" dirty="0"/>
-              <a:t>Kein  Datenblatt zu Sensoren</a:t>
+              <a:t>Verbauen der Technik vs. Baum – „Look“</a:t>
             </a:r>
           </a:p>
           <a:p>
             <a:r>
               <a:rPr lang="de-DE" dirty="0"/>
-              <a:t>Daher bislang keine Tests möglich</a:t>
-            </a:r>
-          </a:p>
-          <a:p>
-            <a:endParaRPr lang="de-DE" dirty="0"/>
-          </a:p>
-          <a:p>
-            <a:r>
-              <a:rPr lang="de-DE" dirty="0"/>
-              <a:t>-&gt; Warten auf Hardware</a:t>
-            </a:r>
-          </a:p>
-          <a:p>
-            <a:endParaRPr lang="de-DE" dirty="0"/>
+              <a:t>Gehäuse und LED Integration</a:t>
+            </a:r>
           </a:p>
           <a:p>
             <a:pPr marL="457200" lvl="1" indent="0">
@@ -5918,7 +7670,7 @@
     </p:spTree>
     <p:extLst>
       <p:ext uri="{BB962C8B-B14F-4D97-AF65-F5344CB8AC3E}">
-        <p14:creationId xmlns:p14="http://schemas.microsoft.com/office/powerpoint/2010/main" val="3841598285"/>
+        <p14:creationId xmlns:p14="http://schemas.microsoft.com/office/powerpoint/2010/main" val="1670918476"/>
       </p:ext>
     </p:extLst>
   </p:cSld>
@@ -5968,7 +7720,7 @@
           <a:p>
             <a:r>
               <a:rPr lang="de-DE" dirty="0"/>
-              <a:t>Datemodell Fahrzeuge</a:t>
+              <a:t>Schaltplan - Stand</a:t>
             </a:r>
           </a:p>
         </p:txBody>
@@ -5993,12 +7745,6 @@
         <p:txBody>
           <a:bodyPr/>
           <a:lstStyle/>
-          <a:p>
-            <a:r>
-              <a:rPr lang="de-DE" dirty="0"/>
-              <a:t>BILD(JSON)</a:t>
-            </a:r>
-          </a:p>
           <a:p>
             <a:pPr marL="457200" lvl="1" indent="0">
               <a:buNone/>
@@ -6013,10 +7759,46 @@
           </a:p>
         </p:txBody>
       </p:sp>
+      <p:pic>
+        <p:nvPicPr>
+          <p:cNvPr id="5" name="Grafik 4" descr="Ein Bild, das Tisch, grün, Computer, Schild enthält.&#10;&#10;Automatisch generierte Beschreibung">
+            <a:extLst>
+              <a:ext uri="{FF2B5EF4-FFF2-40B4-BE49-F238E27FC236}">
+                <a16:creationId xmlns:a16="http://schemas.microsoft.com/office/drawing/2014/main" id="{989681F4-8743-4E3E-BFB8-4A9A8C85B1BA}"/>
+              </a:ext>
+            </a:extLst>
+          </p:cNvPr>
+          <p:cNvPicPr>
+            <a:picLocks noChangeAspect="1"/>
+          </p:cNvPicPr>
+          <p:nvPr/>
+        </p:nvPicPr>
+        <p:blipFill>
+          <a:blip r:embed="rId3">
+            <a:extLst>
+              <a:ext uri="{28A0092B-C50C-407E-A947-70E740481C1C}">
+                <a14:useLocalDpi xmlns:a14="http://schemas.microsoft.com/office/drawing/2010/main" val="0"/>
+              </a:ext>
+            </a:extLst>
+          </a:blip>
+          <a:stretch>
+            <a:fillRect/>
+          </a:stretch>
+        </p:blipFill>
+        <p:spPr>
+          <a:xfrm>
+            <a:off x="1571368" y="1342404"/>
+            <a:ext cx="9049264" cy="5515596"/>
+          </a:xfrm>
+          <a:prstGeom prst="rect">
+            <a:avLst/>
+          </a:prstGeom>
+        </p:spPr>
+      </p:pic>
     </p:spTree>
     <p:extLst>
       <p:ext uri="{BB962C8B-B14F-4D97-AF65-F5344CB8AC3E}">
-        <p14:creationId xmlns:p14="http://schemas.microsoft.com/office/powerpoint/2010/main" val="1309895707"/>
+        <p14:creationId xmlns:p14="http://schemas.microsoft.com/office/powerpoint/2010/main" val="2006520549"/>
       </p:ext>
     </p:extLst>
   </p:cSld>

</xml_diff>

<commit_message>
add json image to presentation
</commit_message>
<xml_diff>
--- a/workshops/2019_10_23/Präsentation 23_10_2019.pptx
+++ b/workshops/2019_10_23/Präsentation 23_10_2019.pptx
@@ -211,7 +211,7 @@
           <a:p>
             <a:fld id="{E3599E8E-A991-475F-AF77-DE09EB48F9ED}" type="datetimeFigureOut">
               <a:rPr lang="de-DE" smtClean="0"/>
-              <a:t>21.10.2019</a:t>
+              <a:t>22.10.2019</a:t>
             </a:fld>
             <a:endParaRPr lang="de-DE"/>
           </a:p>
@@ -369,7 +369,7 @@
           <a:p>
             <a:fld id="{11428D28-81C1-40CB-B8E7-71448353209F}" type="slidenum">
               <a:rPr lang="de-DE" smtClean="0"/>
-              <a:t>‹#›</a:t>
+              <a:t>‹Nr.›</a:t>
             </a:fld>
             <a:endParaRPr lang="de-DE"/>
           </a:p>
@@ -1843,7 +1843,7 @@
           <a:p>
             <a:fld id="{1DFF6629-E111-4711-A1D3-7DE9729EAF6D}" type="datetimeFigureOut">
               <a:rPr lang="de-DE" smtClean="0"/>
-              <a:t>21.10.2019</a:t>
+              <a:t>22.10.2019</a:t>
             </a:fld>
             <a:endParaRPr lang="de-DE"/>
           </a:p>
@@ -1897,7 +1897,7 @@
           <a:p>
             <a:fld id="{A312F13E-1E93-4F6D-B514-E99E3F42818D}" type="slidenum">
               <a:rPr lang="de-DE" smtClean="0"/>
-              <a:t>‹#›</a:t>
+              <a:t>‹Nr.›</a:t>
             </a:fld>
             <a:endParaRPr lang="de-DE"/>
           </a:p>
@@ -2041,7 +2041,7 @@
           <a:p>
             <a:fld id="{1DFF6629-E111-4711-A1D3-7DE9729EAF6D}" type="datetimeFigureOut">
               <a:rPr lang="de-DE" smtClean="0"/>
-              <a:t>21.10.2019</a:t>
+              <a:t>22.10.2019</a:t>
             </a:fld>
             <a:endParaRPr lang="de-DE"/>
           </a:p>
@@ -2095,7 +2095,7 @@
           <a:p>
             <a:fld id="{A312F13E-1E93-4F6D-B514-E99E3F42818D}" type="slidenum">
               <a:rPr lang="de-DE" smtClean="0"/>
-              <a:t>‹#›</a:t>
+              <a:t>‹Nr.›</a:t>
             </a:fld>
             <a:endParaRPr lang="de-DE"/>
           </a:p>
@@ -2249,7 +2249,7 @@
           <a:p>
             <a:fld id="{1DFF6629-E111-4711-A1D3-7DE9729EAF6D}" type="datetimeFigureOut">
               <a:rPr lang="de-DE" smtClean="0"/>
-              <a:t>21.10.2019</a:t>
+              <a:t>22.10.2019</a:t>
             </a:fld>
             <a:endParaRPr lang="de-DE"/>
           </a:p>
@@ -2303,7 +2303,7 @@
           <a:p>
             <a:fld id="{A312F13E-1E93-4F6D-B514-E99E3F42818D}" type="slidenum">
               <a:rPr lang="de-DE" smtClean="0"/>
-              <a:t>‹#›</a:t>
+              <a:t>‹Nr.›</a:t>
             </a:fld>
             <a:endParaRPr lang="de-DE"/>
           </a:p>
@@ -2447,7 +2447,7 @@
           <a:p>
             <a:fld id="{1DFF6629-E111-4711-A1D3-7DE9729EAF6D}" type="datetimeFigureOut">
               <a:rPr lang="de-DE" smtClean="0"/>
-              <a:t>21.10.2019</a:t>
+              <a:t>22.10.2019</a:t>
             </a:fld>
             <a:endParaRPr lang="de-DE"/>
           </a:p>
@@ -2501,7 +2501,7 @@
           <a:p>
             <a:fld id="{A312F13E-1E93-4F6D-B514-E99E3F42818D}" type="slidenum">
               <a:rPr lang="de-DE" smtClean="0"/>
-              <a:t>‹#›</a:t>
+              <a:t>‹Nr.›</a:t>
             </a:fld>
             <a:endParaRPr lang="de-DE"/>
           </a:p>
@@ -2722,7 +2722,7 @@
           <a:p>
             <a:fld id="{1DFF6629-E111-4711-A1D3-7DE9729EAF6D}" type="datetimeFigureOut">
               <a:rPr lang="de-DE" smtClean="0"/>
-              <a:t>21.10.2019</a:t>
+              <a:t>22.10.2019</a:t>
             </a:fld>
             <a:endParaRPr lang="de-DE"/>
           </a:p>
@@ -2776,7 +2776,7 @@
           <a:p>
             <a:fld id="{A312F13E-1E93-4F6D-B514-E99E3F42818D}" type="slidenum">
               <a:rPr lang="de-DE" smtClean="0"/>
-              <a:t>‹#›</a:t>
+              <a:t>‹Nr.›</a:t>
             </a:fld>
             <a:endParaRPr lang="de-DE"/>
           </a:p>
@@ -2987,7 +2987,7 @@
           <a:p>
             <a:fld id="{1DFF6629-E111-4711-A1D3-7DE9729EAF6D}" type="datetimeFigureOut">
               <a:rPr lang="de-DE" smtClean="0"/>
-              <a:t>21.10.2019</a:t>
+              <a:t>22.10.2019</a:t>
             </a:fld>
             <a:endParaRPr lang="de-DE"/>
           </a:p>
@@ -3041,7 +3041,7 @@
           <a:p>
             <a:fld id="{A312F13E-1E93-4F6D-B514-E99E3F42818D}" type="slidenum">
               <a:rPr lang="de-DE" smtClean="0"/>
-              <a:t>‹#›</a:t>
+              <a:t>‹Nr.›</a:t>
             </a:fld>
             <a:endParaRPr lang="de-DE"/>
           </a:p>
@@ -3399,7 +3399,7 @@
           <a:p>
             <a:fld id="{1DFF6629-E111-4711-A1D3-7DE9729EAF6D}" type="datetimeFigureOut">
               <a:rPr lang="de-DE" smtClean="0"/>
-              <a:t>21.10.2019</a:t>
+              <a:t>22.10.2019</a:t>
             </a:fld>
             <a:endParaRPr lang="de-DE"/>
           </a:p>
@@ -3453,7 +3453,7 @@
           <a:p>
             <a:fld id="{A312F13E-1E93-4F6D-B514-E99E3F42818D}" type="slidenum">
               <a:rPr lang="de-DE" smtClean="0"/>
-              <a:t>‹#›</a:t>
+              <a:t>‹Nr.›</a:t>
             </a:fld>
             <a:endParaRPr lang="de-DE"/>
           </a:p>
@@ -3540,7 +3540,7 @@
           <a:p>
             <a:fld id="{1DFF6629-E111-4711-A1D3-7DE9729EAF6D}" type="datetimeFigureOut">
               <a:rPr lang="de-DE" smtClean="0"/>
-              <a:t>21.10.2019</a:t>
+              <a:t>22.10.2019</a:t>
             </a:fld>
             <a:endParaRPr lang="de-DE"/>
           </a:p>
@@ -3594,7 +3594,7 @@
           <a:p>
             <a:fld id="{A312F13E-1E93-4F6D-B514-E99E3F42818D}" type="slidenum">
               <a:rPr lang="de-DE" smtClean="0"/>
-              <a:t>‹#›</a:t>
+              <a:t>‹Nr.›</a:t>
             </a:fld>
             <a:endParaRPr lang="de-DE"/>
           </a:p>
@@ -3653,7 +3653,7 @@
           <a:p>
             <a:fld id="{1DFF6629-E111-4711-A1D3-7DE9729EAF6D}" type="datetimeFigureOut">
               <a:rPr lang="de-DE" smtClean="0"/>
-              <a:t>21.10.2019</a:t>
+              <a:t>22.10.2019</a:t>
             </a:fld>
             <a:endParaRPr lang="de-DE"/>
           </a:p>
@@ -3707,7 +3707,7 @@
           <a:p>
             <a:fld id="{A312F13E-1E93-4F6D-B514-E99E3F42818D}" type="slidenum">
               <a:rPr lang="de-DE" smtClean="0"/>
-              <a:t>‹#›</a:t>
+              <a:t>‹Nr.›</a:t>
             </a:fld>
             <a:endParaRPr lang="de-DE"/>
           </a:p>
@@ -3964,7 +3964,7 @@
           <a:p>
             <a:fld id="{1DFF6629-E111-4711-A1D3-7DE9729EAF6D}" type="datetimeFigureOut">
               <a:rPr lang="de-DE" smtClean="0"/>
-              <a:t>21.10.2019</a:t>
+              <a:t>22.10.2019</a:t>
             </a:fld>
             <a:endParaRPr lang="de-DE"/>
           </a:p>
@@ -4018,7 +4018,7 @@
           <a:p>
             <a:fld id="{A312F13E-1E93-4F6D-B514-E99E3F42818D}" type="slidenum">
               <a:rPr lang="de-DE" smtClean="0"/>
-              <a:t>‹#›</a:t>
+              <a:t>‹Nr.›</a:t>
             </a:fld>
             <a:endParaRPr lang="de-DE"/>
           </a:p>
@@ -4252,7 +4252,7 @@
           <a:p>
             <a:fld id="{1DFF6629-E111-4711-A1D3-7DE9729EAF6D}" type="datetimeFigureOut">
               <a:rPr lang="de-DE" smtClean="0"/>
-              <a:t>21.10.2019</a:t>
+              <a:t>22.10.2019</a:t>
             </a:fld>
             <a:endParaRPr lang="de-DE"/>
           </a:p>
@@ -4306,7 +4306,7 @@
           <a:p>
             <a:fld id="{A312F13E-1E93-4F6D-B514-E99E3F42818D}" type="slidenum">
               <a:rPr lang="de-DE" smtClean="0"/>
-              <a:t>‹#›</a:t>
+              <a:t>‹Nr.›</a:t>
             </a:fld>
             <a:endParaRPr lang="de-DE"/>
           </a:p>
@@ -4502,7 +4502,7 @@
           <a:p>
             <a:fld id="{1DFF6629-E111-4711-A1D3-7DE9729EAF6D}" type="datetimeFigureOut">
               <a:rPr lang="de-DE" smtClean="0"/>
-              <a:t>21.10.2019</a:t>
+              <a:t>22.10.2019</a:t>
             </a:fld>
             <a:endParaRPr lang="de-DE"/>
           </a:p>
@@ -4592,7 +4592,7 @@
           <a:p>
             <a:fld id="{A312F13E-1E93-4F6D-B514-E99E3F42818D}" type="slidenum">
               <a:rPr lang="de-DE" smtClean="0"/>
-              <a:t>‹#›</a:t>
+              <a:t>‹Nr.›</a:t>
             </a:fld>
             <a:endParaRPr lang="de-DE"/>
           </a:p>
@@ -5319,12 +5319,6 @@
           <a:bodyPr/>
           <a:lstStyle/>
           <a:p>
-            <a:r>
-              <a:rPr lang="de-DE" dirty="0"/>
-              <a:t>BILD(JSON)</a:t>
-            </a:r>
-          </a:p>
-          <a:p>
             <a:pPr marL="457200" lvl="1" indent="0">
               <a:buNone/>
             </a:pPr>
@@ -5338,6 +5332,36 @@
           </a:p>
         </p:txBody>
       </p:sp>
+      <p:pic>
+        <p:nvPicPr>
+          <p:cNvPr id="4" name="Grafik 3">
+            <a:extLst>
+              <a:ext uri="{FF2B5EF4-FFF2-40B4-BE49-F238E27FC236}">
+                <a16:creationId xmlns:a16="http://schemas.microsoft.com/office/drawing/2014/main" id="{7E7DE02B-5857-4D6B-B89C-92E4ABCE531B}"/>
+              </a:ext>
+            </a:extLst>
+          </p:cNvPr>
+          <p:cNvPicPr>
+            <a:picLocks noChangeAspect="1"/>
+          </p:cNvPicPr>
+          <p:nvPr/>
+        </p:nvPicPr>
+        <p:blipFill>
+          <a:blip r:embed="rId3"/>
+          <a:stretch>
+            <a:fillRect/>
+          </a:stretch>
+        </p:blipFill>
+        <p:spPr>
+          <a:xfrm>
+            <a:off x="4087197" y="2199788"/>
+            <a:ext cx="4017606" cy="2598343"/>
+          </a:xfrm>
+          <a:prstGeom prst="rect">
+            <a:avLst/>
+          </a:prstGeom>
+        </p:spPr>
+      </p:pic>
     </p:spTree>
     <p:extLst>
       <p:ext uri="{BB962C8B-B14F-4D97-AF65-F5344CB8AC3E}">

</xml_diff>

<commit_message>
tree img + tree in slides
</commit_message>
<xml_diff>
--- a/workshops/2019_10_23/Präsentation 23_10_2019.pptx
+++ b/workshops/2019_10_23/Präsentation 23_10_2019.pptx
@@ -369,7 +369,7 @@
           <a:p>
             <a:fld id="{11428D28-81C1-40CB-B8E7-71448353209F}" type="slidenum">
               <a:rPr lang="de-DE" smtClean="0"/>
-              <a:t>‹Nr.›</a:t>
+              <a:t>‹#›</a:t>
             </a:fld>
             <a:endParaRPr lang="de-DE"/>
           </a:p>
@@ -1897,7 +1897,7 @@
           <a:p>
             <a:fld id="{A312F13E-1E93-4F6D-B514-E99E3F42818D}" type="slidenum">
               <a:rPr lang="de-DE" smtClean="0"/>
-              <a:t>‹Nr.›</a:t>
+              <a:t>‹#›</a:t>
             </a:fld>
             <a:endParaRPr lang="de-DE"/>
           </a:p>
@@ -2095,7 +2095,7 @@
           <a:p>
             <a:fld id="{A312F13E-1E93-4F6D-B514-E99E3F42818D}" type="slidenum">
               <a:rPr lang="de-DE" smtClean="0"/>
-              <a:t>‹Nr.›</a:t>
+              <a:t>‹#›</a:t>
             </a:fld>
             <a:endParaRPr lang="de-DE"/>
           </a:p>
@@ -2303,7 +2303,7 @@
           <a:p>
             <a:fld id="{A312F13E-1E93-4F6D-B514-E99E3F42818D}" type="slidenum">
               <a:rPr lang="de-DE" smtClean="0"/>
-              <a:t>‹Nr.›</a:t>
+              <a:t>‹#›</a:t>
             </a:fld>
             <a:endParaRPr lang="de-DE"/>
           </a:p>
@@ -2501,7 +2501,7 @@
           <a:p>
             <a:fld id="{A312F13E-1E93-4F6D-B514-E99E3F42818D}" type="slidenum">
               <a:rPr lang="de-DE" smtClean="0"/>
-              <a:t>‹Nr.›</a:t>
+              <a:t>‹#›</a:t>
             </a:fld>
             <a:endParaRPr lang="de-DE"/>
           </a:p>
@@ -2776,7 +2776,7 @@
           <a:p>
             <a:fld id="{A312F13E-1E93-4F6D-B514-E99E3F42818D}" type="slidenum">
               <a:rPr lang="de-DE" smtClean="0"/>
-              <a:t>‹Nr.›</a:t>
+              <a:t>‹#›</a:t>
             </a:fld>
             <a:endParaRPr lang="de-DE"/>
           </a:p>
@@ -3041,7 +3041,7 @@
           <a:p>
             <a:fld id="{A312F13E-1E93-4F6D-B514-E99E3F42818D}" type="slidenum">
               <a:rPr lang="de-DE" smtClean="0"/>
-              <a:t>‹Nr.›</a:t>
+              <a:t>‹#›</a:t>
             </a:fld>
             <a:endParaRPr lang="de-DE"/>
           </a:p>
@@ -3453,7 +3453,7 @@
           <a:p>
             <a:fld id="{A312F13E-1E93-4F6D-B514-E99E3F42818D}" type="slidenum">
               <a:rPr lang="de-DE" smtClean="0"/>
-              <a:t>‹Nr.›</a:t>
+              <a:t>‹#›</a:t>
             </a:fld>
             <a:endParaRPr lang="de-DE"/>
           </a:p>
@@ -3594,7 +3594,7 @@
           <a:p>
             <a:fld id="{A312F13E-1E93-4F6D-B514-E99E3F42818D}" type="slidenum">
               <a:rPr lang="de-DE" smtClean="0"/>
-              <a:t>‹Nr.›</a:t>
+              <a:t>‹#›</a:t>
             </a:fld>
             <a:endParaRPr lang="de-DE"/>
           </a:p>
@@ -3707,7 +3707,7 @@
           <a:p>
             <a:fld id="{A312F13E-1E93-4F6D-B514-E99E3F42818D}" type="slidenum">
               <a:rPr lang="de-DE" smtClean="0"/>
-              <a:t>‹Nr.›</a:t>
+              <a:t>‹#›</a:t>
             </a:fld>
             <a:endParaRPr lang="de-DE"/>
           </a:p>
@@ -4018,7 +4018,7 @@
           <a:p>
             <a:fld id="{A312F13E-1E93-4F6D-B514-E99E3F42818D}" type="slidenum">
               <a:rPr lang="de-DE" smtClean="0"/>
-              <a:t>‹Nr.›</a:t>
+              <a:t>‹#›</a:t>
             </a:fld>
             <a:endParaRPr lang="de-DE"/>
           </a:p>
@@ -4306,7 +4306,7 @@
           <a:p>
             <a:fld id="{A312F13E-1E93-4F6D-B514-E99E3F42818D}" type="slidenum">
               <a:rPr lang="de-DE" smtClean="0"/>
-              <a:t>‹Nr.›</a:t>
+              <a:t>‹#›</a:t>
             </a:fld>
             <a:endParaRPr lang="de-DE"/>
           </a:p>
@@ -4592,7 +4592,7 @@
           <a:p>
             <a:fld id="{A312F13E-1E93-4F6D-B514-E99E3F42818D}" type="slidenum">
               <a:rPr lang="de-DE" smtClean="0"/>
-              <a:t>‹Nr.›</a:t>
+              <a:t>‹#›</a:t>
             </a:fld>
             <a:endParaRPr lang="de-DE"/>
           </a:p>
@@ -7528,9 +7528,16 @@
             <p:ph idx="1"/>
           </p:nvPr>
         </p:nvSpPr>
-        <p:spPr/>
-        <p:txBody>
-          <a:bodyPr/>
+        <p:spPr>
+          <a:xfrm>
+            <a:off x="838200" y="1825625"/>
+            <a:ext cx="5257800" cy="1325563"/>
+          </a:xfrm>
+        </p:spPr>
+        <p:txBody>
+          <a:bodyPr>
+            <a:normAutofit lnSpcReduction="10000"/>
+          </a:bodyPr>
           <a:lstStyle/>
           <a:p>
             <a:r>
@@ -7542,15 +7549,6 @@
             <a:r>
               <a:rPr lang="de-DE" dirty="0"/>
               <a:t>Alternative zu Display und Chart.js</a:t>
-            </a:r>
-          </a:p>
-          <a:p>
-            <a:endParaRPr lang="de-DE" dirty="0"/>
-          </a:p>
-          <a:p>
-            <a:r>
-              <a:rPr lang="de-DE" dirty="0"/>
-              <a:t>-&gt; BILD</a:t>
             </a:r>
           </a:p>
           <a:p>
@@ -7567,6 +7565,42 @@
           </a:p>
         </p:txBody>
       </p:sp>
+      <p:pic>
+        <p:nvPicPr>
+          <p:cNvPr id="5" name="Picture 4">
+            <a:extLst>
+              <a:ext uri="{FF2B5EF4-FFF2-40B4-BE49-F238E27FC236}">
+                <a16:creationId xmlns:a16="http://schemas.microsoft.com/office/drawing/2014/main" id="{C0962313-C1C7-4854-A555-86E5A1F94605}"/>
+              </a:ext>
+            </a:extLst>
+          </p:cNvPr>
+          <p:cNvPicPr>
+            <a:picLocks noChangeAspect="1"/>
+          </p:cNvPicPr>
+          <p:nvPr/>
+        </p:nvPicPr>
+        <p:blipFill>
+          <a:blip r:embed="rId3">
+            <a:extLst>
+              <a:ext uri="{28A0092B-C50C-407E-A947-70E740481C1C}">
+                <a14:useLocalDpi xmlns:a14="http://schemas.microsoft.com/office/drawing/2010/main" val="0"/>
+              </a:ext>
+            </a:extLst>
+          </a:blip>
+          <a:stretch>
+            <a:fillRect/>
+          </a:stretch>
+        </p:blipFill>
+        <p:spPr>
+          <a:xfrm>
+            <a:off x="5562405" y="1323667"/>
+            <a:ext cx="6520737" cy="5433947"/>
+          </a:xfrm>
+          <a:prstGeom prst="rect">
+            <a:avLst/>
+          </a:prstGeom>
+        </p:spPr>
+      </p:pic>
     </p:spTree>
     <p:extLst>
       <p:ext uri="{BB962C8B-B14F-4D97-AF65-F5344CB8AC3E}">

</xml_diff>

<commit_message>
updated image in presentation
</commit_message>
<xml_diff>
--- a/workshops/2019_10_23/Präsentation 23_10_2019.pptx
+++ b/workshops/2019_10_23/Präsentation 23_10_2019.pptx
@@ -369,7 +369,7 @@
           <a:p>
             <a:fld id="{11428D28-81C1-40CB-B8E7-71448353209F}" type="slidenum">
               <a:rPr lang="de-DE" smtClean="0"/>
-              <a:t>‹#›</a:t>
+              <a:t>‹Nr.›</a:t>
             </a:fld>
             <a:endParaRPr lang="de-DE"/>
           </a:p>
@@ -1897,7 +1897,7 @@
           <a:p>
             <a:fld id="{A312F13E-1E93-4F6D-B514-E99E3F42818D}" type="slidenum">
               <a:rPr lang="de-DE" smtClean="0"/>
-              <a:t>‹#›</a:t>
+              <a:t>‹Nr.›</a:t>
             </a:fld>
             <a:endParaRPr lang="de-DE"/>
           </a:p>
@@ -2095,7 +2095,7 @@
           <a:p>
             <a:fld id="{A312F13E-1E93-4F6D-B514-E99E3F42818D}" type="slidenum">
               <a:rPr lang="de-DE" smtClean="0"/>
-              <a:t>‹#›</a:t>
+              <a:t>‹Nr.›</a:t>
             </a:fld>
             <a:endParaRPr lang="de-DE"/>
           </a:p>
@@ -2303,7 +2303,7 @@
           <a:p>
             <a:fld id="{A312F13E-1E93-4F6D-B514-E99E3F42818D}" type="slidenum">
               <a:rPr lang="de-DE" smtClean="0"/>
-              <a:t>‹#›</a:t>
+              <a:t>‹Nr.›</a:t>
             </a:fld>
             <a:endParaRPr lang="de-DE"/>
           </a:p>
@@ -2501,7 +2501,7 @@
           <a:p>
             <a:fld id="{A312F13E-1E93-4F6D-B514-E99E3F42818D}" type="slidenum">
               <a:rPr lang="de-DE" smtClean="0"/>
-              <a:t>‹#›</a:t>
+              <a:t>‹Nr.›</a:t>
             </a:fld>
             <a:endParaRPr lang="de-DE"/>
           </a:p>
@@ -2776,7 +2776,7 @@
           <a:p>
             <a:fld id="{A312F13E-1E93-4F6D-B514-E99E3F42818D}" type="slidenum">
               <a:rPr lang="de-DE" smtClean="0"/>
-              <a:t>‹#›</a:t>
+              <a:t>‹Nr.›</a:t>
             </a:fld>
             <a:endParaRPr lang="de-DE"/>
           </a:p>
@@ -3041,7 +3041,7 @@
           <a:p>
             <a:fld id="{A312F13E-1E93-4F6D-B514-E99E3F42818D}" type="slidenum">
               <a:rPr lang="de-DE" smtClean="0"/>
-              <a:t>‹#›</a:t>
+              <a:t>‹Nr.›</a:t>
             </a:fld>
             <a:endParaRPr lang="de-DE"/>
           </a:p>
@@ -3453,7 +3453,7 @@
           <a:p>
             <a:fld id="{A312F13E-1E93-4F6D-B514-E99E3F42818D}" type="slidenum">
               <a:rPr lang="de-DE" smtClean="0"/>
-              <a:t>‹#›</a:t>
+              <a:t>‹Nr.›</a:t>
             </a:fld>
             <a:endParaRPr lang="de-DE"/>
           </a:p>
@@ -3594,7 +3594,7 @@
           <a:p>
             <a:fld id="{A312F13E-1E93-4F6D-B514-E99E3F42818D}" type="slidenum">
               <a:rPr lang="de-DE" smtClean="0"/>
-              <a:t>‹#›</a:t>
+              <a:t>‹Nr.›</a:t>
             </a:fld>
             <a:endParaRPr lang="de-DE"/>
           </a:p>
@@ -3707,7 +3707,7 @@
           <a:p>
             <a:fld id="{A312F13E-1E93-4F6D-B514-E99E3F42818D}" type="slidenum">
               <a:rPr lang="de-DE" smtClean="0"/>
-              <a:t>‹#›</a:t>
+              <a:t>‹Nr.›</a:t>
             </a:fld>
             <a:endParaRPr lang="de-DE"/>
           </a:p>
@@ -4018,7 +4018,7 @@
           <a:p>
             <a:fld id="{A312F13E-1E93-4F6D-B514-E99E3F42818D}" type="slidenum">
               <a:rPr lang="de-DE" smtClean="0"/>
-              <a:t>‹#›</a:t>
+              <a:t>‹Nr.›</a:t>
             </a:fld>
             <a:endParaRPr lang="de-DE"/>
           </a:p>
@@ -4306,7 +4306,7 @@
           <a:p>
             <a:fld id="{A312F13E-1E93-4F6D-B514-E99E3F42818D}" type="slidenum">
               <a:rPr lang="de-DE" smtClean="0"/>
-              <a:t>‹#›</a:t>
+              <a:t>‹Nr.›</a:t>
             </a:fld>
             <a:endParaRPr lang="de-DE"/>
           </a:p>
@@ -4592,7 +4592,7 @@
           <a:p>
             <a:fld id="{A312F13E-1E93-4F6D-B514-E99E3F42818D}" type="slidenum">
               <a:rPr lang="de-DE" smtClean="0"/>
-              <a:t>‹#›</a:t>
+              <a:t>‹Nr.›</a:t>
             </a:fld>
             <a:endParaRPr lang="de-DE"/>
           </a:p>
@@ -5354,7 +5354,7 @@
         </p:blipFill>
         <p:spPr>
           <a:xfrm>
-            <a:off x="4087197" y="2199788"/>
+            <a:off x="4087197" y="2129828"/>
             <a:ext cx="4017606" cy="2598343"/>
           </a:xfrm>
           <a:prstGeom prst="rect">

</xml_diff>